<commit_message>
GPU lecture finished for use of November 3, 2021 at CPPCON
</commit_message>
<xml_diff>
--- a/Lesson_Materials/Lecture_14A_Think_and_Optimize_GPU/Think_and_Optimize_GPU.pptx
+++ b/Lesson_Materials/Lecture_14A_Think_and_Optimize_GPU/Think_and_Optimize_GPU.pptx
@@ -5,7 +5,25 @@
     <p:sldMasterId id="2147483648" r:id="rId1"/>
   </p:sldMasterIdLst>
   <p:sldIdLst>
-    <p:sldId id="256" r:id="rId2"/>
+    <p:sldId id="257" r:id="rId2"/>
+    <p:sldId id="260" r:id="rId3"/>
+    <p:sldId id="261" r:id="rId4"/>
+    <p:sldId id="259" r:id="rId5"/>
+    <p:sldId id="262" r:id="rId6"/>
+    <p:sldId id="263" r:id="rId7"/>
+    <p:sldId id="264" r:id="rId8"/>
+    <p:sldId id="265" r:id="rId9"/>
+    <p:sldId id="266" r:id="rId10"/>
+    <p:sldId id="267" r:id="rId11"/>
+    <p:sldId id="268" r:id="rId12"/>
+    <p:sldId id="269" r:id="rId13"/>
+    <p:sldId id="270" r:id="rId14"/>
+    <p:sldId id="271" r:id="rId15"/>
+    <p:sldId id="272" r:id="rId16"/>
+    <p:sldId id="273" r:id="rId17"/>
+    <p:sldId id="274" r:id="rId18"/>
+    <p:sldId id="275" r:id="rId19"/>
+    <p:sldId id="276" r:id="rId20"/>
   </p:sldIdLst>
   <p:sldSz cx="12192000" cy="6858000"/>
   <p:notesSz cx="6858000" cy="9144000"/>
@@ -104,7 +122,424 @@
       </a:defRPr>
     </a:lvl9pPr>
   </p:defaultTextStyle>
+  <p:extLst>
+    <p:ext uri="{EFAFB233-063F-42B5-8137-9DF3F51BA10A}">
+      <p15:sldGuideLst xmlns:p15="http://schemas.microsoft.com/office/powerpoint/2012/main"/>
+    </p:ext>
+  </p:extLst>
 </p:presentation>
+</file>
+
+<file path=ppt/revisionInfo.xml><?xml version="1.0" encoding="utf-8"?>
+<p1510:revInfo xmlns:a="http://schemas.openxmlformats.org/drawingml/2006/main" xmlns:r="http://schemas.openxmlformats.org/officeDocument/2006/relationships" xmlns:p1510="http://schemas.microsoft.com/office/powerpoint/2015/10/main">
+  <p1510:revLst>
+    <p1510:client id="{EC8D51A4-CC50-407D-BDBD-1BE218636053}" v="4" dt="2021-10-25T16:51:37.877"/>
+  </p1510:revLst>
+</p1510:revInfo>
+</file>
+
+<file path=ppt/changesInfos/changesInfo1.xml><?xml version="1.0" encoding="utf-8"?>
+<pc:chgInfo xmlns:a="http://schemas.openxmlformats.org/drawingml/2006/main" xmlns:r="http://schemas.openxmlformats.org/officeDocument/2006/relationships" xmlns:ac="http://schemas.microsoft.com/office/drawing/2013/main/command" xmlns:pc="http://schemas.microsoft.com/office/powerpoint/2013/main/command">
+  <pc:docChgLst>
+    <pc:chgData name="Ashbaugh, Ben" userId="d2c6f720-df23-414b-985a-610e04eebb23" providerId="ADAL" clId="{3F8CC5C1-04DF-4E57-9BD1-26E2DB6EB95F}"/>
+    <pc:docChg chg="undo custSel modSld">
+      <pc:chgData name="Ashbaugh, Ben" userId="d2c6f720-df23-414b-985a-610e04eebb23" providerId="ADAL" clId="{3F8CC5C1-04DF-4E57-9BD1-26E2DB6EB95F}" dt="2021-10-25T22:39:42.901" v="63" actId="20577"/>
+      <pc:docMkLst>
+        <pc:docMk/>
+      </pc:docMkLst>
+      <pc:sldChg chg="modSp mod">
+        <pc:chgData name="Ashbaugh, Ben" userId="d2c6f720-df23-414b-985a-610e04eebb23" providerId="ADAL" clId="{3F8CC5C1-04DF-4E57-9BD1-26E2DB6EB95F}" dt="2021-10-25T22:27:35.097" v="1" actId="20577"/>
+        <pc:sldMkLst>
+          <pc:docMk/>
+          <pc:sldMk cId="1217652597" sldId="257"/>
+        </pc:sldMkLst>
+        <pc:spChg chg="mod">
+          <ac:chgData name="Ashbaugh, Ben" userId="d2c6f720-df23-414b-985a-610e04eebb23" providerId="ADAL" clId="{3F8CC5C1-04DF-4E57-9BD1-26E2DB6EB95F}" dt="2021-10-25T22:27:35.097" v="1" actId="20577"/>
+          <ac:spMkLst>
+            <pc:docMk/>
+            <pc:sldMk cId="1217652597" sldId="257"/>
+            <ac:spMk id="3" creationId="{EB5C02ED-2421-4824-B144-E948F1DB3F9E}"/>
+          </ac:spMkLst>
+        </pc:spChg>
+      </pc:sldChg>
+      <pc:sldChg chg="modSp mod">
+        <pc:chgData name="Ashbaugh, Ben" userId="d2c6f720-df23-414b-985a-610e04eebb23" providerId="ADAL" clId="{3F8CC5C1-04DF-4E57-9BD1-26E2DB6EB95F}" dt="2021-10-25T22:29:19.077" v="13" actId="20577"/>
+        <pc:sldMkLst>
+          <pc:docMk/>
+          <pc:sldMk cId="2430250862" sldId="259"/>
+        </pc:sldMkLst>
+        <pc:spChg chg="mod">
+          <ac:chgData name="Ashbaugh, Ben" userId="d2c6f720-df23-414b-985a-610e04eebb23" providerId="ADAL" clId="{3F8CC5C1-04DF-4E57-9BD1-26E2DB6EB95F}" dt="2021-10-25T22:29:19.077" v="13" actId="20577"/>
+          <ac:spMkLst>
+            <pc:docMk/>
+            <pc:sldMk cId="2430250862" sldId="259"/>
+            <ac:spMk id="6" creationId="{5FC634AE-64D3-407E-867F-408F91FEB423}"/>
+          </ac:spMkLst>
+        </pc:spChg>
+      </pc:sldChg>
+      <pc:sldChg chg="modSp mod">
+        <pc:chgData name="Ashbaugh, Ben" userId="d2c6f720-df23-414b-985a-610e04eebb23" providerId="ADAL" clId="{3F8CC5C1-04DF-4E57-9BD1-26E2DB6EB95F}" dt="2021-10-25T22:28:23.792" v="3" actId="20577"/>
+        <pc:sldMkLst>
+          <pc:docMk/>
+          <pc:sldMk cId="1952717894" sldId="261"/>
+        </pc:sldMkLst>
+        <pc:spChg chg="mod">
+          <ac:chgData name="Ashbaugh, Ben" userId="d2c6f720-df23-414b-985a-610e04eebb23" providerId="ADAL" clId="{3F8CC5C1-04DF-4E57-9BD1-26E2DB6EB95F}" dt="2021-10-25T22:28:23.792" v="3" actId="20577"/>
+          <ac:spMkLst>
+            <pc:docMk/>
+            <pc:sldMk cId="1952717894" sldId="261"/>
+            <ac:spMk id="5" creationId="{D530F38F-1B82-4B15-80AA-21CE44E088E5}"/>
+          </ac:spMkLst>
+        </pc:spChg>
+      </pc:sldChg>
+      <pc:sldChg chg="modSp mod">
+        <pc:chgData name="Ashbaugh, Ben" userId="d2c6f720-df23-414b-985a-610e04eebb23" providerId="ADAL" clId="{3F8CC5C1-04DF-4E57-9BD1-26E2DB6EB95F}" dt="2021-10-25T22:37:46.230" v="23" actId="20577"/>
+        <pc:sldMkLst>
+          <pc:docMk/>
+          <pc:sldMk cId="1468257985" sldId="271"/>
+        </pc:sldMkLst>
+        <pc:spChg chg="mod">
+          <ac:chgData name="Ashbaugh, Ben" userId="d2c6f720-df23-414b-985a-610e04eebb23" providerId="ADAL" clId="{3F8CC5C1-04DF-4E57-9BD1-26E2DB6EB95F}" dt="2021-10-25T22:37:46.230" v="23" actId="20577"/>
+          <ac:spMkLst>
+            <pc:docMk/>
+            <pc:sldMk cId="1468257985" sldId="271"/>
+            <ac:spMk id="3" creationId="{54F62EAD-694D-4E2C-8B37-A80638D35C72}"/>
+          </ac:spMkLst>
+        </pc:spChg>
+      </pc:sldChg>
+      <pc:sldChg chg="modSp mod">
+        <pc:chgData name="Ashbaugh, Ben" userId="d2c6f720-df23-414b-985a-610e04eebb23" providerId="ADAL" clId="{3F8CC5C1-04DF-4E57-9BD1-26E2DB6EB95F}" dt="2021-10-25T22:38:26.500" v="61" actId="20577"/>
+        <pc:sldMkLst>
+          <pc:docMk/>
+          <pc:sldMk cId="3907256517" sldId="273"/>
+        </pc:sldMkLst>
+        <pc:spChg chg="mod">
+          <ac:chgData name="Ashbaugh, Ben" userId="d2c6f720-df23-414b-985a-610e04eebb23" providerId="ADAL" clId="{3F8CC5C1-04DF-4E57-9BD1-26E2DB6EB95F}" dt="2021-10-25T22:38:26.500" v="61" actId="20577"/>
+          <ac:spMkLst>
+            <pc:docMk/>
+            <pc:sldMk cId="3907256517" sldId="273"/>
+            <ac:spMk id="5" creationId="{5DD9767C-15B8-4860-90BD-085A8188381F}"/>
+          </ac:spMkLst>
+        </pc:spChg>
+      </pc:sldChg>
+      <pc:sldChg chg="modSp mod">
+        <pc:chgData name="Ashbaugh, Ben" userId="d2c6f720-df23-414b-985a-610e04eebb23" providerId="ADAL" clId="{3F8CC5C1-04DF-4E57-9BD1-26E2DB6EB95F}" dt="2021-10-25T22:39:42.901" v="63" actId="20577"/>
+        <pc:sldMkLst>
+          <pc:docMk/>
+          <pc:sldMk cId="622483751" sldId="276"/>
+        </pc:sldMkLst>
+        <pc:spChg chg="mod">
+          <ac:chgData name="Ashbaugh, Ben" userId="d2c6f720-df23-414b-985a-610e04eebb23" providerId="ADAL" clId="{3F8CC5C1-04DF-4E57-9BD1-26E2DB6EB95F}" dt="2021-10-25T22:39:42.901" v="63" actId="20577"/>
+          <ac:spMkLst>
+            <pc:docMk/>
+            <pc:sldMk cId="622483751" sldId="276"/>
+            <ac:spMk id="5" creationId="{CB352A9F-04DB-4954-8360-FD876CBA10A2}"/>
+          </ac:spMkLst>
+        </pc:spChg>
+      </pc:sldChg>
+    </pc:docChg>
+  </pc:docChgLst>
+  <pc:docChgLst>
+    <pc:chgData name="Reinders, James R" userId="c7bd31a8-60e1-4215-8a81-9e5db9d09101" providerId="ADAL" clId="{EC8D51A4-CC50-407D-BDBD-1BE218636053}"/>
+    <pc:docChg chg="undo custSel addSld delSld modSld">
+      <pc:chgData name="Reinders, James R" userId="c7bd31a8-60e1-4215-8a81-9e5db9d09101" providerId="ADAL" clId="{EC8D51A4-CC50-407D-BDBD-1BE218636053}" dt="2021-10-25T16:51:27.695" v="415" actId="20577"/>
+      <pc:docMkLst>
+        <pc:docMk/>
+      </pc:docMkLst>
+      <pc:sldChg chg="del">
+        <pc:chgData name="Reinders, James R" userId="c7bd31a8-60e1-4215-8a81-9e5db9d09101" providerId="ADAL" clId="{EC8D51A4-CC50-407D-BDBD-1BE218636053}" dt="2021-10-25T16:36:19.012" v="1" actId="2696"/>
+        <pc:sldMkLst>
+          <pc:docMk/>
+          <pc:sldMk cId="247524480" sldId="256"/>
+        </pc:sldMkLst>
+      </pc:sldChg>
+      <pc:sldChg chg="add">
+        <pc:chgData name="Reinders, James R" userId="c7bd31a8-60e1-4215-8a81-9e5db9d09101" providerId="ADAL" clId="{EC8D51A4-CC50-407D-BDBD-1BE218636053}" dt="2021-10-25T16:33:38.287" v="0"/>
+        <pc:sldMkLst>
+          <pc:docMk/>
+          <pc:sldMk cId="1217652597" sldId="257"/>
+        </pc:sldMkLst>
+      </pc:sldChg>
+      <pc:sldChg chg="add del">
+        <pc:chgData name="Reinders, James R" userId="c7bd31a8-60e1-4215-8a81-9e5db9d09101" providerId="ADAL" clId="{EC8D51A4-CC50-407D-BDBD-1BE218636053}" dt="2021-10-25T16:36:28.996" v="2" actId="47"/>
+        <pc:sldMkLst>
+          <pc:docMk/>
+          <pc:sldMk cId="1990900951" sldId="258"/>
+        </pc:sldMkLst>
+      </pc:sldChg>
+      <pc:sldChg chg="add">
+        <pc:chgData name="Reinders, James R" userId="c7bd31a8-60e1-4215-8a81-9e5db9d09101" providerId="ADAL" clId="{EC8D51A4-CC50-407D-BDBD-1BE218636053}" dt="2021-10-25T16:33:38.287" v="0"/>
+        <pc:sldMkLst>
+          <pc:docMk/>
+          <pc:sldMk cId="2430250862" sldId="259"/>
+        </pc:sldMkLst>
+      </pc:sldChg>
+      <pc:sldChg chg="add">
+        <pc:chgData name="Reinders, James R" userId="c7bd31a8-60e1-4215-8a81-9e5db9d09101" providerId="ADAL" clId="{EC8D51A4-CC50-407D-BDBD-1BE218636053}" dt="2021-10-25T16:33:38.287" v="0"/>
+        <pc:sldMkLst>
+          <pc:docMk/>
+          <pc:sldMk cId="2438840291" sldId="260"/>
+        </pc:sldMkLst>
+      </pc:sldChg>
+      <pc:sldChg chg="add">
+        <pc:chgData name="Reinders, James R" userId="c7bd31a8-60e1-4215-8a81-9e5db9d09101" providerId="ADAL" clId="{EC8D51A4-CC50-407D-BDBD-1BE218636053}" dt="2021-10-25T16:33:38.287" v="0"/>
+        <pc:sldMkLst>
+          <pc:docMk/>
+          <pc:sldMk cId="1952717894" sldId="261"/>
+        </pc:sldMkLst>
+      </pc:sldChg>
+      <pc:sldChg chg="modSp add mod">
+        <pc:chgData name="Reinders, James R" userId="c7bd31a8-60e1-4215-8a81-9e5db9d09101" providerId="ADAL" clId="{EC8D51A4-CC50-407D-BDBD-1BE218636053}" dt="2021-10-25T16:43:12.274" v="87" actId="1035"/>
+        <pc:sldMkLst>
+          <pc:docMk/>
+          <pc:sldMk cId="1400799503" sldId="262"/>
+        </pc:sldMkLst>
+        <pc:spChg chg="mod">
+          <ac:chgData name="Reinders, James R" userId="c7bd31a8-60e1-4215-8a81-9e5db9d09101" providerId="ADAL" clId="{EC8D51A4-CC50-407D-BDBD-1BE218636053}" dt="2021-10-25T16:43:12.274" v="87" actId="1035"/>
+          <ac:spMkLst>
+            <pc:docMk/>
+            <pc:sldMk cId="1400799503" sldId="262"/>
+            <ac:spMk id="10" creationId="{E297BF78-7F82-490E-984C-5E6F3D676F80}"/>
+          </ac:spMkLst>
+        </pc:spChg>
+        <pc:picChg chg="mod">
+          <ac:chgData name="Reinders, James R" userId="c7bd31a8-60e1-4215-8a81-9e5db9d09101" providerId="ADAL" clId="{EC8D51A4-CC50-407D-BDBD-1BE218636053}" dt="2021-10-25T16:37:21.468" v="7" actId="1076"/>
+          <ac:picMkLst>
+            <pc:docMk/>
+            <pc:sldMk cId="1400799503" sldId="262"/>
+            <ac:picMk id="7" creationId="{72A04610-2884-4418-B5C7-7BDFAF2F23A4}"/>
+          </ac:picMkLst>
+        </pc:picChg>
+      </pc:sldChg>
+      <pc:sldChg chg="modSp add mod">
+        <pc:chgData name="Reinders, James R" userId="c7bd31a8-60e1-4215-8a81-9e5db9d09101" providerId="ADAL" clId="{EC8D51A4-CC50-407D-BDBD-1BE218636053}" dt="2021-10-25T16:37:43.561" v="13" actId="14100"/>
+        <pc:sldMkLst>
+          <pc:docMk/>
+          <pc:sldMk cId="2408983685" sldId="263"/>
+        </pc:sldMkLst>
+        <pc:spChg chg="mod">
+          <ac:chgData name="Reinders, James R" userId="c7bd31a8-60e1-4215-8a81-9e5db9d09101" providerId="ADAL" clId="{EC8D51A4-CC50-407D-BDBD-1BE218636053}" dt="2021-10-25T16:37:43.561" v="13" actId="14100"/>
+          <ac:spMkLst>
+            <pc:docMk/>
+            <pc:sldMk cId="2408983685" sldId="263"/>
+            <ac:spMk id="9" creationId="{0DB50C7B-65CD-4F7D-A482-DF130ED66FD6}"/>
+          </ac:spMkLst>
+        </pc:spChg>
+        <pc:picChg chg="mod">
+          <ac:chgData name="Reinders, James R" userId="c7bd31a8-60e1-4215-8a81-9e5db9d09101" providerId="ADAL" clId="{EC8D51A4-CC50-407D-BDBD-1BE218636053}" dt="2021-10-25T16:37:35.288" v="11" actId="1076"/>
+          <ac:picMkLst>
+            <pc:docMk/>
+            <pc:sldMk cId="2408983685" sldId="263"/>
+            <ac:picMk id="6" creationId="{2300B94A-035F-443E-8755-99E78AB1FC7F}"/>
+          </ac:picMkLst>
+        </pc:picChg>
+      </pc:sldChg>
+      <pc:sldChg chg="add">
+        <pc:chgData name="Reinders, James R" userId="c7bd31a8-60e1-4215-8a81-9e5db9d09101" providerId="ADAL" clId="{EC8D51A4-CC50-407D-BDBD-1BE218636053}" dt="2021-10-25T16:33:38.287" v="0"/>
+        <pc:sldMkLst>
+          <pc:docMk/>
+          <pc:sldMk cId="1500951581" sldId="264"/>
+        </pc:sldMkLst>
+      </pc:sldChg>
+      <pc:sldChg chg="modSp add mod">
+        <pc:chgData name="Reinders, James R" userId="c7bd31a8-60e1-4215-8a81-9e5db9d09101" providerId="ADAL" clId="{EC8D51A4-CC50-407D-BDBD-1BE218636053}" dt="2021-10-25T16:38:06.560" v="57" actId="1037"/>
+        <pc:sldMkLst>
+          <pc:docMk/>
+          <pc:sldMk cId="1922355098" sldId="265"/>
+        </pc:sldMkLst>
+        <pc:picChg chg="mod">
+          <ac:chgData name="Reinders, James R" userId="c7bd31a8-60e1-4215-8a81-9e5db9d09101" providerId="ADAL" clId="{EC8D51A4-CC50-407D-BDBD-1BE218636053}" dt="2021-10-25T16:38:00.405" v="15" actId="14100"/>
+          <ac:picMkLst>
+            <pc:docMk/>
+            <pc:sldMk cId="1922355098" sldId="265"/>
+            <ac:picMk id="5" creationId="{1B514EC1-5B51-4050-A0DD-8E5B39935C0C}"/>
+          </ac:picMkLst>
+        </pc:picChg>
+        <pc:picChg chg="mod">
+          <ac:chgData name="Reinders, James R" userId="c7bd31a8-60e1-4215-8a81-9e5db9d09101" providerId="ADAL" clId="{EC8D51A4-CC50-407D-BDBD-1BE218636053}" dt="2021-10-25T16:38:06.560" v="57" actId="1037"/>
+          <ac:picMkLst>
+            <pc:docMk/>
+            <pc:sldMk cId="1922355098" sldId="265"/>
+            <ac:picMk id="9" creationId="{592BEDA7-D336-489B-87BF-E9A4519C1033}"/>
+          </ac:picMkLst>
+        </pc:picChg>
+      </pc:sldChg>
+      <pc:sldChg chg="add">
+        <pc:chgData name="Reinders, James R" userId="c7bd31a8-60e1-4215-8a81-9e5db9d09101" providerId="ADAL" clId="{EC8D51A4-CC50-407D-BDBD-1BE218636053}" dt="2021-10-25T16:33:38.287" v="0"/>
+        <pc:sldMkLst>
+          <pc:docMk/>
+          <pc:sldMk cId="3858959561" sldId="266"/>
+        </pc:sldMkLst>
+      </pc:sldChg>
+      <pc:sldChg chg="modSp add mod">
+        <pc:chgData name="Reinders, James R" userId="c7bd31a8-60e1-4215-8a81-9e5db9d09101" providerId="ADAL" clId="{EC8D51A4-CC50-407D-BDBD-1BE218636053}" dt="2021-10-25T16:44:47.702" v="89" actId="1076"/>
+        <pc:sldMkLst>
+          <pc:docMk/>
+          <pc:sldMk cId="2834772630" sldId="267"/>
+        </pc:sldMkLst>
+        <pc:picChg chg="mod">
+          <ac:chgData name="Reinders, James R" userId="c7bd31a8-60e1-4215-8a81-9e5db9d09101" providerId="ADAL" clId="{EC8D51A4-CC50-407D-BDBD-1BE218636053}" dt="2021-10-25T16:44:47.702" v="89" actId="1076"/>
+          <ac:picMkLst>
+            <pc:docMk/>
+            <pc:sldMk cId="2834772630" sldId="267"/>
+            <ac:picMk id="7" creationId="{49D3DA08-0341-41B2-99B3-A5B85C9E7014}"/>
+          </ac:picMkLst>
+        </pc:picChg>
+      </pc:sldChg>
+      <pc:sldChg chg="add">
+        <pc:chgData name="Reinders, James R" userId="c7bd31a8-60e1-4215-8a81-9e5db9d09101" providerId="ADAL" clId="{EC8D51A4-CC50-407D-BDBD-1BE218636053}" dt="2021-10-25T16:33:38.287" v="0"/>
+        <pc:sldMkLst>
+          <pc:docMk/>
+          <pc:sldMk cId="1417485090" sldId="268"/>
+        </pc:sldMkLst>
+      </pc:sldChg>
+      <pc:sldChg chg="modSp add mod">
+        <pc:chgData name="Reinders, James R" userId="c7bd31a8-60e1-4215-8a81-9e5db9d09101" providerId="ADAL" clId="{EC8D51A4-CC50-407D-BDBD-1BE218636053}" dt="2021-10-25T16:38:50.348" v="68" actId="14100"/>
+        <pc:sldMkLst>
+          <pc:docMk/>
+          <pc:sldMk cId="452085810" sldId="269"/>
+        </pc:sldMkLst>
+        <pc:spChg chg="mod">
+          <ac:chgData name="Reinders, James R" userId="c7bd31a8-60e1-4215-8a81-9e5db9d09101" providerId="ADAL" clId="{EC8D51A4-CC50-407D-BDBD-1BE218636053}" dt="2021-10-25T16:38:30.820" v="61" actId="14100"/>
+          <ac:spMkLst>
+            <pc:docMk/>
+            <pc:sldMk cId="452085810" sldId="269"/>
+            <ac:spMk id="7" creationId="{69A79B4F-C0C9-47DB-8E98-4603CC2F7D34}"/>
+          </ac:spMkLst>
+        </pc:spChg>
+        <pc:spChg chg="mod">
+          <ac:chgData name="Reinders, James R" userId="c7bd31a8-60e1-4215-8a81-9e5db9d09101" providerId="ADAL" clId="{EC8D51A4-CC50-407D-BDBD-1BE218636053}" dt="2021-10-25T16:38:39.893" v="67" actId="14100"/>
+          <ac:spMkLst>
+            <pc:docMk/>
+            <pc:sldMk cId="452085810" sldId="269"/>
+            <ac:spMk id="8" creationId="{B6518582-C32D-42B9-8322-1751D8672F23}"/>
+          </ac:spMkLst>
+        </pc:spChg>
+        <pc:picChg chg="mod">
+          <ac:chgData name="Reinders, James R" userId="c7bd31a8-60e1-4215-8a81-9e5db9d09101" providerId="ADAL" clId="{EC8D51A4-CC50-407D-BDBD-1BE218636053}" dt="2021-10-25T16:38:25.508" v="59" actId="14100"/>
+          <ac:picMkLst>
+            <pc:docMk/>
+            <pc:sldMk cId="452085810" sldId="269"/>
+            <ac:picMk id="6" creationId="{09782ED8-D5AC-44A4-AA41-C7C64A76E339}"/>
+          </ac:picMkLst>
+        </pc:picChg>
+        <pc:picChg chg="mod">
+          <ac:chgData name="Reinders, James R" userId="c7bd31a8-60e1-4215-8a81-9e5db9d09101" providerId="ADAL" clId="{EC8D51A4-CC50-407D-BDBD-1BE218636053}" dt="2021-10-25T16:38:50.348" v="68" actId="14100"/>
+          <ac:picMkLst>
+            <pc:docMk/>
+            <pc:sldMk cId="452085810" sldId="269"/>
+            <ac:picMk id="10" creationId="{E9EC487C-E96E-4224-928F-5C4470DB10B1}"/>
+          </ac:picMkLst>
+        </pc:picChg>
+      </pc:sldChg>
+      <pc:sldChg chg="modSp add mod">
+        <pc:chgData name="Reinders, James R" userId="c7bd31a8-60e1-4215-8a81-9e5db9d09101" providerId="ADAL" clId="{EC8D51A4-CC50-407D-BDBD-1BE218636053}" dt="2021-10-25T16:45:16.310" v="101" actId="1076"/>
+        <pc:sldMkLst>
+          <pc:docMk/>
+          <pc:sldMk cId="1842813080" sldId="270"/>
+        </pc:sldMkLst>
+        <pc:spChg chg="mod">
+          <ac:chgData name="Reinders, James R" userId="c7bd31a8-60e1-4215-8a81-9e5db9d09101" providerId="ADAL" clId="{EC8D51A4-CC50-407D-BDBD-1BE218636053}" dt="2021-10-25T16:45:12.382" v="99" actId="1076"/>
+          <ac:spMkLst>
+            <pc:docMk/>
+            <pc:sldMk cId="1842813080" sldId="270"/>
+            <ac:spMk id="7" creationId="{57E9D644-E42E-452C-A97F-25718F7FC408}"/>
+          </ac:spMkLst>
+        </pc:spChg>
+        <pc:spChg chg="mod">
+          <ac:chgData name="Reinders, James R" userId="c7bd31a8-60e1-4215-8a81-9e5db9d09101" providerId="ADAL" clId="{EC8D51A4-CC50-407D-BDBD-1BE218636053}" dt="2021-10-25T16:45:12.382" v="99" actId="1076"/>
+          <ac:spMkLst>
+            <pc:docMk/>
+            <pc:sldMk cId="1842813080" sldId="270"/>
+            <ac:spMk id="8" creationId="{C1C31E07-4184-4857-9CD9-BE9AC77F4E43}"/>
+          </ac:spMkLst>
+        </pc:spChg>
+        <pc:picChg chg="mod">
+          <ac:chgData name="Reinders, James R" userId="c7bd31a8-60e1-4215-8a81-9e5db9d09101" providerId="ADAL" clId="{EC8D51A4-CC50-407D-BDBD-1BE218636053}" dt="2021-10-25T16:45:12.382" v="99" actId="1076"/>
+          <ac:picMkLst>
+            <pc:docMk/>
+            <pc:sldMk cId="1842813080" sldId="270"/>
+            <ac:picMk id="6" creationId="{65102BDE-9AD8-4550-B76A-FA54F8F68544}"/>
+          </ac:picMkLst>
+        </pc:picChg>
+        <pc:picChg chg="mod ord">
+          <ac:chgData name="Reinders, James R" userId="c7bd31a8-60e1-4215-8a81-9e5db9d09101" providerId="ADAL" clId="{EC8D51A4-CC50-407D-BDBD-1BE218636053}" dt="2021-10-25T16:45:16.310" v="101" actId="1076"/>
+          <ac:picMkLst>
+            <pc:docMk/>
+            <pc:sldMk cId="1842813080" sldId="270"/>
+            <ac:picMk id="10" creationId="{FF62D859-96A6-4DF5-B572-9D13865CA27A}"/>
+          </ac:picMkLst>
+        </pc:picChg>
+      </pc:sldChg>
+      <pc:sldChg chg="modSp add mod">
+        <pc:chgData name="Reinders, James R" userId="c7bd31a8-60e1-4215-8a81-9e5db9d09101" providerId="ADAL" clId="{EC8D51A4-CC50-407D-BDBD-1BE218636053}" dt="2021-10-25T16:39:19.342" v="77" actId="14100"/>
+        <pc:sldMkLst>
+          <pc:docMk/>
+          <pc:sldMk cId="1468257985" sldId="271"/>
+        </pc:sldMkLst>
+        <pc:picChg chg="mod">
+          <ac:chgData name="Reinders, James R" userId="c7bd31a8-60e1-4215-8a81-9e5db9d09101" providerId="ADAL" clId="{EC8D51A4-CC50-407D-BDBD-1BE218636053}" dt="2021-10-25T16:39:19.342" v="77" actId="14100"/>
+          <ac:picMkLst>
+            <pc:docMk/>
+            <pc:sldMk cId="1468257985" sldId="271"/>
+            <ac:picMk id="6" creationId="{33C35CC9-38FC-45F0-B5EE-FAD42698C363}"/>
+          </ac:picMkLst>
+        </pc:picChg>
+      </pc:sldChg>
+      <pc:sldChg chg="add">
+        <pc:chgData name="Reinders, James R" userId="c7bd31a8-60e1-4215-8a81-9e5db9d09101" providerId="ADAL" clId="{EC8D51A4-CC50-407D-BDBD-1BE218636053}" dt="2021-10-25T16:33:38.287" v="0"/>
+        <pc:sldMkLst>
+          <pc:docMk/>
+          <pc:sldMk cId="106169795" sldId="272"/>
+        </pc:sldMkLst>
+      </pc:sldChg>
+      <pc:sldChg chg="add">
+        <pc:chgData name="Reinders, James R" userId="c7bd31a8-60e1-4215-8a81-9e5db9d09101" providerId="ADAL" clId="{EC8D51A4-CC50-407D-BDBD-1BE218636053}" dt="2021-10-25T16:33:38.287" v="0"/>
+        <pc:sldMkLst>
+          <pc:docMk/>
+          <pc:sldMk cId="3907256517" sldId="273"/>
+        </pc:sldMkLst>
+      </pc:sldChg>
+      <pc:sldChg chg="addSp modSp add mod">
+        <pc:chgData name="Reinders, James R" userId="c7bd31a8-60e1-4215-8a81-9e5db9d09101" providerId="ADAL" clId="{EC8D51A4-CC50-407D-BDBD-1BE218636053}" dt="2021-10-25T16:51:27.695" v="415" actId="20577"/>
+        <pc:sldMkLst>
+          <pc:docMk/>
+          <pc:sldMk cId="3993520985" sldId="274"/>
+        </pc:sldMkLst>
+        <pc:spChg chg="mod">
+          <ac:chgData name="Reinders, James R" userId="c7bd31a8-60e1-4215-8a81-9e5db9d09101" providerId="ADAL" clId="{EC8D51A4-CC50-407D-BDBD-1BE218636053}" dt="2021-10-25T16:48:38.853" v="197" actId="20577"/>
+          <ac:spMkLst>
+            <pc:docMk/>
+            <pc:sldMk cId="3993520985" sldId="274"/>
+            <ac:spMk id="3" creationId="{2DCEF4AC-AB46-48F2-97F3-0DF4715C24EA}"/>
+          </ac:spMkLst>
+        </pc:spChg>
+        <pc:spChg chg="add mod">
+          <ac:chgData name="Reinders, James R" userId="c7bd31a8-60e1-4215-8a81-9e5db9d09101" providerId="ADAL" clId="{EC8D51A4-CC50-407D-BDBD-1BE218636053}" dt="2021-10-25T16:51:27.695" v="415" actId="20577"/>
+          <ac:spMkLst>
+            <pc:docMk/>
+            <pc:sldMk cId="3993520985" sldId="274"/>
+            <ac:spMk id="4" creationId="{E32D3E54-30AA-4CF5-8B81-655AD28D8E39}"/>
+          </ac:spMkLst>
+        </pc:spChg>
+      </pc:sldChg>
+      <pc:sldChg chg="add">
+        <pc:chgData name="Reinders, James R" userId="c7bd31a8-60e1-4215-8a81-9e5db9d09101" providerId="ADAL" clId="{EC8D51A4-CC50-407D-BDBD-1BE218636053}" dt="2021-10-25T16:33:38.287" v="0"/>
+        <pc:sldMkLst>
+          <pc:docMk/>
+          <pc:sldMk cId="2152089164" sldId="275"/>
+        </pc:sldMkLst>
+      </pc:sldChg>
+      <pc:sldChg chg="add">
+        <pc:chgData name="Reinders, James R" userId="c7bd31a8-60e1-4215-8a81-9e5db9d09101" providerId="ADAL" clId="{EC8D51A4-CC50-407D-BDBD-1BE218636053}" dt="2021-10-25T16:33:38.287" v="0"/>
+        <pc:sldMkLst>
+          <pc:docMk/>
+          <pc:sldMk cId="622483751" sldId="276"/>
+        </pc:sldMkLst>
+      </pc:sldChg>
+    </pc:docChg>
+  </pc:docChgLst>
+</pc:chgInfo>
 </file>
 
 <file path=ppt/slideLayouts/slideLayout1.xml><?xml version="1.0" encoding="utf-8"?>
@@ -386,10 +821,9 @@
           </a:lstStyle>
           <a:p>
             <a:r>
-              <a:rPr lang="en-US"/>
+              <a:rPr lang="en-US" dirty="0"/>
               <a:t>SYCL and the SYCL logo are trademarks of the Khronos Group Inc.</a:t>
             </a:r>
-            <a:endParaRPr lang="en-US" dirty="0"/>
           </a:p>
         </p:txBody>
       </p:sp>
@@ -810,10 +1244,9 @@
           </a:lstStyle>
           <a:p>
             <a:r>
-              <a:rPr lang="en-US"/>
+              <a:rPr lang="en-US" dirty="0"/>
               <a:t>SYCL and the SYCL logo are trademarks of the Khronos Group Inc.</a:t>
             </a:r>
-            <a:endParaRPr lang="en-US" dirty="0"/>
           </a:p>
         </p:txBody>
       </p:sp>
@@ -963,10 +1396,9 @@
           </a:lstStyle>
           <a:p>
             <a:r>
-              <a:rPr lang="en-US"/>
+              <a:rPr lang="en-US" dirty="0"/>
               <a:t>SYCL and the SYCL logo are trademarks of the Khronos Group Inc.</a:t>
             </a:r>
-            <a:endParaRPr lang="en-US" dirty="0"/>
           </a:p>
         </p:txBody>
       </p:sp>
@@ -1088,10 +1520,9 @@
           </a:lstStyle>
           <a:p>
             <a:r>
-              <a:rPr lang="en-US"/>
+              <a:rPr lang="en-US" dirty="0"/>
               <a:t>SYCL and the SYCL logo are trademarks of the Khronos Group Inc.</a:t>
             </a:r>
-            <a:endParaRPr lang="en-US" dirty="0"/>
           </a:p>
         </p:txBody>
       </p:sp>
@@ -1147,6 +1578,546 @@
     <p:extLst>
       <p:ext uri="{BB962C8B-B14F-4D97-AF65-F5344CB8AC3E}">
         <p14:creationId xmlns:p14="http://schemas.microsoft.com/office/powerpoint/2010/main" val="4074632050"/>
+      </p:ext>
+    </p:extLst>
+  </p:cSld>
+  <p:clrMapOvr>
+    <a:masterClrMapping/>
+  </p:clrMapOvr>
+</p:sldLayout>
+</file>
+
+<file path=ppt/slideLayouts/slideLayout6.xml><?xml version="1.0" encoding="utf-8"?>
+<p:sldLayout xmlns:a="http://schemas.openxmlformats.org/drawingml/2006/main" xmlns:r="http://schemas.openxmlformats.org/officeDocument/2006/relationships" xmlns:p="http://schemas.openxmlformats.org/presentationml/2006/main" type="secHead">
+  <p:cSld name="Section Header">
+    <p:spTree>
+      <p:nvGrpSpPr>
+        <p:cNvPr id="1" name=""/>
+        <p:cNvGrpSpPr/>
+        <p:nvPr/>
+      </p:nvGrpSpPr>
+      <p:grpSpPr>
+        <a:xfrm>
+          <a:off x="0" y="0"/>
+          <a:ext cx="0" cy="0"/>
+          <a:chOff x="0" y="0"/>
+          <a:chExt cx="0" cy="0"/>
+        </a:xfrm>
+      </p:grpSpPr>
+      <p:sp>
+        <p:nvSpPr>
+          <p:cNvPr id="2" name="Title 1">
+            <a:extLst>
+              <a:ext uri="{FF2B5EF4-FFF2-40B4-BE49-F238E27FC236}">
+                <a16:creationId xmlns:a16="http://schemas.microsoft.com/office/drawing/2014/main" id="{3A04AD4B-B793-4490-B225-9C074178ECD8}"/>
+              </a:ext>
+            </a:extLst>
+          </p:cNvPr>
+          <p:cNvSpPr>
+            <a:spLocks noGrp="1"/>
+          </p:cNvSpPr>
+          <p:nvPr>
+            <p:ph type="title"/>
+          </p:nvPr>
+        </p:nvSpPr>
+        <p:spPr>
+          <a:xfrm>
+            <a:off x="831850" y="1709738"/>
+            <a:ext cx="10515600" cy="2852737"/>
+          </a:xfrm>
+        </p:spPr>
+        <p:txBody>
+          <a:bodyPr anchor="b"/>
+          <a:lstStyle>
+            <a:lvl1pPr>
+              <a:defRPr sz="6000"/>
+            </a:lvl1pPr>
+          </a:lstStyle>
+          <a:p>
+            <a:r>
+              <a:rPr lang="en-US"/>
+              <a:t>Click to edit Master title style</a:t>
+            </a:r>
+          </a:p>
+        </p:txBody>
+      </p:sp>
+      <p:sp>
+        <p:nvSpPr>
+          <p:cNvPr id="3" name="Text Placeholder 2">
+            <a:extLst>
+              <a:ext uri="{FF2B5EF4-FFF2-40B4-BE49-F238E27FC236}">
+                <a16:creationId xmlns:a16="http://schemas.microsoft.com/office/drawing/2014/main" id="{1EDEBF15-78A0-494A-BDAC-3FFCC0F2F96A}"/>
+              </a:ext>
+            </a:extLst>
+          </p:cNvPr>
+          <p:cNvSpPr>
+            <a:spLocks noGrp="1"/>
+          </p:cNvSpPr>
+          <p:nvPr>
+            <p:ph type="body" idx="1"/>
+          </p:nvPr>
+        </p:nvSpPr>
+        <p:spPr>
+          <a:xfrm>
+            <a:off x="831850" y="4589463"/>
+            <a:ext cx="10515600" cy="1500187"/>
+          </a:xfrm>
+        </p:spPr>
+        <p:txBody>
+          <a:bodyPr/>
+          <a:lstStyle>
+            <a:lvl1pPr marL="0" indent="0">
+              <a:buNone/>
+              <a:defRPr sz="2400">
+                <a:solidFill>
+                  <a:schemeClr val="tx1">
+                    <a:tint val="75000"/>
+                  </a:schemeClr>
+                </a:solidFill>
+              </a:defRPr>
+            </a:lvl1pPr>
+            <a:lvl2pPr marL="457200" indent="0">
+              <a:buNone/>
+              <a:defRPr sz="2000">
+                <a:solidFill>
+                  <a:schemeClr val="tx1">
+                    <a:tint val="75000"/>
+                  </a:schemeClr>
+                </a:solidFill>
+              </a:defRPr>
+            </a:lvl2pPr>
+            <a:lvl3pPr marL="914400" indent="0">
+              <a:buNone/>
+              <a:defRPr sz="1800">
+                <a:solidFill>
+                  <a:schemeClr val="tx1">
+                    <a:tint val="75000"/>
+                  </a:schemeClr>
+                </a:solidFill>
+              </a:defRPr>
+            </a:lvl3pPr>
+            <a:lvl4pPr marL="1371600" indent="0">
+              <a:buNone/>
+              <a:defRPr sz="1600">
+                <a:solidFill>
+                  <a:schemeClr val="tx1">
+                    <a:tint val="75000"/>
+                  </a:schemeClr>
+                </a:solidFill>
+              </a:defRPr>
+            </a:lvl4pPr>
+            <a:lvl5pPr marL="1828800" indent="0">
+              <a:buNone/>
+              <a:defRPr sz="1600">
+                <a:solidFill>
+                  <a:schemeClr val="tx1">
+                    <a:tint val="75000"/>
+                  </a:schemeClr>
+                </a:solidFill>
+              </a:defRPr>
+            </a:lvl5pPr>
+            <a:lvl6pPr marL="2286000" indent="0">
+              <a:buNone/>
+              <a:defRPr sz="1600">
+                <a:solidFill>
+                  <a:schemeClr val="tx1">
+                    <a:tint val="75000"/>
+                  </a:schemeClr>
+                </a:solidFill>
+              </a:defRPr>
+            </a:lvl6pPr>
+            <a:lvl7pPr marL="2743200" indent="0">
+              <a:buNone/>
+              <a:defRPr sz="1600">
+                <a:solidFill>
+                  <a:schemeClr val="tx1">
+                    <a:tint val="75000"/>
+                  </a:schemeClr>
+                </a:solidFill>
+              </a:defRPr>
+            </a:lvl7pPr>
+            <a:lvl8pPr marL="3200400" indent="0">
+              <a:buNone/>
+              <a:defRPr sz="1600">
+                <a:solidFill>
+                  <a:schemeClr val="tx1">
+                    <a:tint val="75000"/>
+                  </a:schemeClr>
+                </a:solidFill>
+              </a:defRPr>
+            </a:lvl8pPr>
+            <a:lvl9pPr marL="3657600" indent="0">
+              <a:buNone/>
+              <a:defRPr sz="1600">
+                <a:solidFill>
+                  <a:schemeClr val="tx1">
+                    <a:tint val="75000"/>
+                  </a:schemeClr>
+                </a:solidFill>
+              </a:defRPr>
+            </a:lvl9pPr>
+          </a:lstStyle>
+          <a:p>
+            <a:pPr lvl="0"/>
+            <a:r>
+              <a:rPr lang="en-US"/>
+              <a:t>Click to edit Master text styles</a:t>
+            </a:r>
+          </a:p>
+        </p:txBody>
+      </p:sp>
+      <p:sp>
+        <p:nvSpPr>
+          <p:cNvPr id="4" name="Date Placeholder 3">
+            <a:extLst>
+              <a:ext uri="{FF2B5EF4-FFF2-40B4-BE49-F238E27FC236}">
+                <a16:creationId xmlns:a16="http://schemas.microsoft.com/office/drawing/2014/main" id="{0FC88640-4049-49F6-A32B-89A79583C649}"/>
+              </a:ext>
+            </a:extLst>
+          </p:cNvPr>
+          <p:cNvSpPr>
+            <a:spLocks noGrp="1"/>
+          </p:cNvSpPr>
+          <p:nvPr>
+            <p:ph type="dt" sz="half" idx="10"/>
+          </p:nvPr>
+        </p:nvSpPr>
+        <p:spPr/>
+        <p:txBody>
+          <a:bodyPr/>
+          <a:lstStyle/>
+          <a:p>
+            <a:fld id="{10984C5A-C0B7-4CF3-8A1A-BB2DB6805B73}" type="datetimeFigureOut">
+              <a:rPr lang="en-US" smtClean="0"/>
+              <a:t>10/25/2021</a:t>
+            </a:fld>
+            <a:endParaRPr lang="en-US"/>
+          </a:p>
+        </p:txBody>
+      </p:sp>
+      <p:sp>
+        <p:nvSpPr>
+          <p:cNvPr id="5" name="Footer Placeholder 4">
+            <a:extLst>
+              <a:ext uri="{FF2B5EF4-FFF2-40B4-BE49-F238E27FC236}">
+                <a16:creationId xmlns:a16="http://schemas.microsoft.com/office/drawing/2014/main" id="{19B49193-4513-4555-B5B8-F2144363585B}"/>
+              </a:ext>
+            </a:extLst>
+          </p:cNvPr>
+          <p:cNvSpPr>
+            <a:spLocks noGrp="1"/>
+          </p:cNvSpPr>
+          <p:nvPr>
+            <p:ph type="ftr" sz="quarter" idx="11"/>
+          </p:nvPr>
+        </p:nvSpPr>
+        <p:spPr/>
+        <p:txBody>
+          <a:bodyPr/>
+          <a:lstStyle/>
+          <a:p>
+            <a:endParaRPr lang="en-US"/>
+          </a:p>
+        </p:txBody>
+      </p:sp>
+      <p:sp>
+        <p:nvSpPr>
+          <p:cNvPr id="6" name="Slide Number Placeholder 5">
+            <a:extLst>
+              <a:ext uri="{FF2B5EF4-FFF2-40B4-BE49-F238E27FC236}">
+                <a16:creationId xmlns:a16="http://schemas.microsoft.com/office/drawing/2014/main" id="{C95E1358-8ABC-4EC2-847F-0CD9746E7162}"/>
+              </a:ext>
+            </a:extLst>
+          </p:cNvPr>
+          <p:cNvSpPr>
+            <a:spLocks noGrp="1"/>
+          </p:cNvSpPr>
+          <p:nvPr>
+            <p:ph type="sldNum" sz="quarter" idx="12"/>
+          </p:nvPr>
+        </p:nvSpPr>
+        <p:spPr/>
+        <p:txBody>
+          <a:bodyPr/>
+          <a:lstStyle/>
+          <a:p>
+            <a:fld id="{28F48F65-1744-4235-BB08-CC54859BBBF4}" type="slidenum">
+              <a:rPr lang="en-US" smtClean="0"/>
+              <a:t>‹#›</a:t>
+            </a:fld>
+            <a:endParaRPr lang="en-US"/>
+          </a:p>
+        </p:txBody>
+      </p:sp>
+    </p:spTree>
+    <p:extLst>
+      <p:ext uri="{BB962C8B-B14F-4D97-AF65-F5344CB8AC3E}">
+        <p14:creationId xmlns:p14="http://schemas.microsoft.com/office/powerpoint/2010/main" val="1920530071"/>
+      </p:ext>
+    </p:extLst>
+  </p:cSld>
+  <p:clrMapOvr>
+    <a:masterClrMapping/>
+  </p:clrMapOvr>
+</p:sldLayout>
+</file>
+
+<file path=ppt/slideLayouts/slideLayout7.xml><?xml version="1.0" encoding="utf-8"?>
+<p:sldLayout xmlns:a="http://schemas.openxmlformats.org/drawingml/2006/main" xmlns:r="http://schemas.openxmlformats.org/officeDocument/2006/relationships" xmlns:p="http://schemas.openxmlformats.org/presentationml/2006/main" type="twoObj">
+  <p:cSld name="Two Content">
+    <p:spTree>
+      <p:nvGrpSpPr>
+        <p:cNvPr id="1" name=""/>
+        <p:cNvGrpSpPr/>
+        <p:nvPr/>
+      </p:nvGrpSpPr>
+      <p:grpSpPr>
+        <a:xfrm>
+          <a:off x="0" y="0"/>
+          <a:ext cx="0" cy="0"/>
+          <a:chOff x="0" y="0"/>
+          <a:chExt cx="0" cy="0"/>
+        </a:xfrm>
+      </p:grpSpPr>
+      <p:sp>
+        <p:nvSpPr>
+          <p:cNvPr id="2" name="Title 1">
+            <a:extLst>
+              <a:ext uri="{FF2B5EF4-FFF2-40B4-BE49-F238E27FC236}">
+                <a16:creationId xmlns:a16="http://schemas.microsoft.com/office/drawing/2014/main" id="{9E9838AC-7E00-4C19-8826-1C3D012CAAC4}"/>
+              </a:ext>
+            </a:extLst>
+          </p:cNvPr>
+          <p:cNvSpPr>
+            <a:spLocks noGrp="1"/>
+          </p:cNvSpPr>
+          <p:nvPr>
+            <p:ph type="title"/>
+          </p:nvPr>
+        </p:nvSpPr>
+        <p:spPr/>
+        <p:txBody>
+          <a:bodyPr/>
+          <a:lstStyle/>
+          <a:p>
+            <a:r>
+              <a:rPr lang="en-US"/>
+              <a:t>Click to edit Master title style</a:t>
+            </a:r>
+          </a:p>
+        </p:txBody>
+      </p:sp>
+      <p:sp>
+        <p:nvSpPr>
+          <p:cNvPr id="3" name="Content Placeholder 2">
+            <a:extLst>
+              <a:ext uri="{FF2B5EF4-FFF2-40B4-BE49-F238E27FC236}">
+                <a16:creationId xmlns:a16="http://schemas.microsoft.com/office/drawing/2014/main" id="{85B3D93C-F5C2-4890-A071-D46CB418CD51}"/>
+              </a:ext>
+            </a:extLst>
+          </p:cNvPr>
+          <p:cNvSpPr>
+            <a:spLocks noGrp="1"/>
+          </p:cNvSpPr>
+          <p:nvPr>
+            <p:ph sz="half" idx="1"/>
+          </p:nvPr>
+        </p:nvSpPr>
+        <p:spPr>
+          <a:xfrm>
+            <a:off x="838200" y="1825625"/>
+            <a:ext cx="5181600" cy="4351338"/>
+          </a:xfrm>
+        </p:spPr>
+        <p:txBody>
+          <a:bodyPr/>
+          <a:lstStyle/>
+          <a:p>
+            <a:pPr lvl="0"/>
+            <a:r>
+              <a:rPr lang="en-US"/>
+              <a:t>Click to edit Master text styles</a:t>
+            </a:r>
+          </a:p>
+          <a:p>
+            <a:pPr lvl="1"/>
+            <a:r>
+              <a:rPr lang="en-US"/>
+              <a:t>Second level</a:t>
+            </a:r>
+          </a:p>
+          <a:p>
+            <a:pPr lvl="2"/>
+            <a:r>
+              <a:rPr lang="en-US"/>
+              <a:t>Third level</a:t>
+            </a:r>
+          </a:p>
+          <a:p>
+            <a:pPr lvl="3"/>
+            <a:r>
+              <a:rPr lang="en-US"/>
+              <a:t>Fourth level</a:t>
+            </a:r>
+          </a:p>
+          <a:p>
+            <a:pPr lvl="4"/>
+            <a:r>
+              <a:rPr lang="en-US"/>
+              <a:t>Fifth level</a:t>
+            </a:r>
+          </a:p>
+        </p:txBody>
+      </p:sp>
+      <p:sp>
+        <p:nvSpPr>
+          <p:cNvPr id="4" name="Content Placeholder 3">
+            <a:extLst>
+              <a:ext uri="{FF2B5EF4-FFF2-40B4-BE49-F238E27FC236}">
+                <a16:creationId xmlns:a16="http://schemas.microsoft.com/office/drawing/2014/main" id="{AB312A0A-181E-4D50-A3CB-8B4C1E93BB3C}"/>
+              </a:ext>
+            </a:extLst>
+          </p:cNvPr>
+          <p:cNvSpPr>
+            <a:spLocks noGrp="1"/>
+          </p:cNvSpPr>
+          <p:nvPr>
+            <p:ph sz="half" idx="2"/>
+          </p:nvPr>
+        </p:nvSpPr>
+        <p:spPr>
+          <a:xfrm>
+            <a:off x="6172200" y="1825625"/>
+            <a:ext cx="5181600" cy="4351338"/>
+          </a:xfrm>
+        </p:spPr>
+        <p:txBody>
+          <a:bodyPr/>
+          <a:lstStyle/>
+          <a:p>
+            <a:pPr lvl="0"/>
+            <a:r>
+              <a:rPr lang="en-US"/>
+              <a:t>Click to edit Master text styles</a:t>
+            </a:r>
+          </a:p>
+          <a:p>
+            <a:pPr lvl="1"/>
+            <a:r>
+              <a:rPr lang="en-US"/>
+              <a:t>Second level</a:t>
+            </a:r>
+          </a:p>
+          <a:p>
+            <a:pPr lvl="2"/>
+            <a:r>
+              <a:rPr lang="en-US"/>
+              <a:t>Third level</a:t>
+            </a:r>
+          </a:p>
+          <a:p>
+            <a:pPr lvl="3"/>
+            <a:r>
+              <a:rPr lang="en-US"/>
+              <a:t>Fourth level</a:t>
+            </a:r>
+          </a:p>
+          <a:p>
+            <a:pPr lvl="4"/>
+            <a:r>
+              <a:rPr lang="en-US"/>
+              <a:t>Fifth level</a:t>
+            </a:r>
+          </a:p>
+        </p:txBody>
+      </p:sp>
+      <p:sp>
+        <p:nvSpPr>
+          <p:cNvPr id="5" name="Date Placeholder 4">
+            <a:extLst>
+              <a:ext uri="{FF2B5EF4-FFF2-40B4-BE49-F238E27FC236}">
+                <a16:creationId xmlns:a16="http://schemas.microsoft.com/office/drawing/2014/main" id="{0597F5CA-E73A-45FE-B146-731FBDAC2A7E}"/>
+              </a:ext>
+            </a:extLst>
+          </p:cNvPr>
+          <p:cNvSpPr>
+            <a:spLocks noGrp="1"/>
+          </p:cNvSpPr>
+          <p:nvPr>
+            <p:ph type="dt" sz="half" idx="10"/>
+          </p:nvPr>
+        </p:nvSpPr>
+        <p:spPr/>
+        <p:txBody>
+          <a:bodyPr/>
+          <a:lstStyle/>
+          <a:p>
+            <a:fld id="{10984C5A-C0B7-4CF3-8A1A-BB2DB6805B73}" type="datetimeFigureOut">
+              <a:rPr lang="en-US" smtClean="0"/>
+              <a:t>10/25/2021</a:t>
+            </a:fld>
+            <a:endParaRPr lang="en-US"/>
+          </a:p>
+        </p:txBody>
+      </p:sp>
+      <p:sp>
+        <p:nvSpPr>
+          <p:cNvPr id="6" name="Footer Placeholder 5">
+            <a:extLst>
+              <a:ext uri="{FF2B5EF4-FFF2-40B4-BE49-F238E27FC236}">
+                <a16:creationId xmlns:a16="http://schemas.microsoft.com/office/drawing/2014/main" id="{61B13F78-7040-43C1-829F-E91AF61C12D3}"/>
+              </a:ext>
+            </a:extLst>
+          </p:cNvPr>
+          <p:cNvSpPr>
+            <a:spLocks noGrp="1"/>
+          </p:cNvSpPr>
+          <p:nvPr>
+            <p:ph type="ftr" sz="quarter" idx="11"/>
+          </p:nvPr>
+        </p:nvSpPr>
+        <p:spPr/>
+        <p:txBody>
+          <a:bodyPr/>
+          <a:lstStyle/>
+          <a:p>
+            <a:endParaRPr lang="en-US"/>
+          </a:p>
+        </p:txBody>
+      </p:sp>
+      <p:sp>
+        <p:nvSpPr>
+          <p:cNvPr id="7" name="Slide Number Placeholder 6">
+            <a:extLst>
+              <a:ext uri="{FF2B5EF4-FFF2-40B4-BE49-F238E27FC236}">
+                <a16:creationId xmlns:a16="http://schemas.microsoft.com/office/drawing/2014/main" id="{EC0BDD3B-BC07-450F-9160-86A7153A1481}"/>
+              </a:ext>
+            </a:extLst>
+          </p:cNvPr>
+          <p:cNvSpPr>
+            <a:spLocks noGrp="1"/>
+          </p:cNvSpPr>
+          <p:nvPr>
+            <p:ph type="sldNum" sz="quarter" idx="12"/>
+          </p:nvPr>
+        </p:nvSpPr>
+        <p:spPr/>
+        <p:txBody>
+          <a:bodyPr/>
+          <a:lstStyle/>
+          <a:p>
+            <a:fld id="{28F48F65-1744-4235-BB08-CC54859BBBF4}" type="slidenum">
+              <a:rPr lang="en-US" smtClean="0"/>
+              <a:t>‹#›</a:t>
+            </a:fld>
+            <a:endParaRPr lang="en-US"/>
+          </a:p>
+        </p:txBody>
+      </p:sp>
+    </p:spTree>
+    <p:extLst>
+      <p:ext uri="{BB962C8B-B14F-4D97-AF65-F5344CB8AC3E}">
+        <p14:creationId xmlns:p14="http://schemas.microsoft.com/office/powerpoint/2010/main" val="3248681639"/>
       </p:ext>
     </p:extLst>
   </p:cSld>
@@ -1193,7 +2164,7 @@
           <p:nvPr userDrawn="1"/>
         </p:nvPicPr>
         <p:blipFill>
-          <a:blip r:embed="rId7">
+          <a:blip r:embed="rId9">
             <a:extLst>
               <a:ext uri="{28A0092B-C50C-407E-A947-70E740481C1C}">
                 <a14:useLocalDpi xmlns:a14="http://schemas.microsoft.com/office/drawing/2010/main" val="0"/>
@@ -1229,7 +2200,7 @@
           <p:nvPr userDrawn="1"/>
         </p:nvPicPr>
         <p:blipFill>
-          <a:blip r:embed="rId8">
+          <a:blip r:embed="rId10">
             <a:extLst>
               <a:ext uri="{28A0092B-C50C-407E-A947-70E740481C1C}">
                 <a14:useLocalDpi xmlns:a14="http://schemas.microsoft.com/office/drawing/2010/main" val="0"/>
@@ -1427,6 +2398,8 @@
     <p:sldLayoutId id="2147483653" r:id="rId3"/>
     <p:sldLayoutId id="2147483654" r:id="rId4"/>
     <p:sldLayoutId id="2147483655" r:id="rId5"/>
+    <p:sldLayoutId id="2147483656" r:id="rId6"/>
+    <p:sldLayoutId id="2147483657" r:id="rId7"/>
   </p:sldLayoutIdLst>
   <p:txStyles>
     <p:titleStyle>
@@ -1733,7 +2706,7 @@
           <p:cNvPr id="2" name="Title 1">
             <a:extLst>
               <a:ext uri="{FF2B5EF4-FFF2-40B4-BE49-F238E27FC236}">
-                <a16:creationId xmlns:a16="http://schemas.microsoft.com/office/drawing/2014/main" id="{EA3174EF-A195-477B-B222-127C7495D4F8}"/>
+                <a16:creationId xmlns:a16="http://schemas.microsoft.com/office/drawing/2014/main" id="{9074AC8D-95AB-4881-8055-5C1D5F78D0E3}"/>
               </a:ext>
             </a:extLst>
           </p:cNvPr>
@@ -1742,6 +2715,36 @@
           </p:cNvSpPr>
           <p:nvPr>
             <p:ph type="ctrTitle"/>
+          </p:nvPr>
+        </p:nvSpPr>
+        <p:spPr/>
+        <p:txBody>
+          <a:bodyPr>
+            <a:normAutofit/>
+          </a:bodyPr>
+          <a:lstStyle/>
+          <a:p>
+            <a:r>
+              <a:rPr lang="en-US" dirty="0"/>
+              <a:t>SYCL GPU Best Practices</a:t>
+            </a:r>
+          </a:p>
+        </p:txBody>
+      </p:sp>
+      <p:sp>
+        <p:nvSpPr>
+          <p:cNvPr id="3" name="Subtitle 2">
+            <a:extLst>
+              <a:ext uri="{FF2B5EF4-FFF2-40B4-BE49-F238E27FC236}">
+                <a16:creationId xmlns:a16="http://schemas.microsoft.com/office/drawing/2014/main" id="{EB5C02ED-2421-4824-B144-E948F1DB3F9E}"/>
+              </a:ext>
+            </a:extLst>
+          </p:cNvPr>
+          <p:cNvSpPr>
+            <a:spLocks noGrp="1"/>
+          </p:cNvSpPr>
+          <p:nvPr>
+            <p:ph type="subTitle" idx="1"/>
           </p:nvPr>
         </p:nvSpPr>
         <p:spPr/>
@@ -1749,39 +2752,2951 @@
           <a:bodyPr/>
           <a:lstStyle/>
           <a:p>
-            <a:endParaRPr lang="en-US"/>
-          </a:p>
-        </p:txBody>
-      </p:sp>
-      <p:sp>
-        <p:nvSpPr>
-          <p:cNvPr id="3" name="Subtitle 2">
-            <a:extLst>
-              <a:ext uri="{FF2B5EF4-FFF2-40B4-BE49-F238E27FC236}">
-                <a16:creationId xmlns:a16="http://schemas.microsoft.com/office/drawing/2014/main" id="{091C246B-87BB-42A2-98AF-11B9DB92609F}"/>
-              </a:ext>
-            </a:extLst>
-          </p:cNvPr>
-          <p:cNvSpPr>
-            <a:spLocks noGrp="1"/>
-          </p:cNvSpPr>
-          <p:nvPr>
-            <p:ph type="subTitle" idx="1"/>
-          </p:nvPr>
-        </p:nvSpPr>
-        <p:spPr/>
-        <p:txBody>
-          <a:bodyPr/>
-          <a:lstStyle/>
-          <a:p>
-            <a:endParaRPr lang="en-US"/>
+            <a:r>
+              <a:rPr lang="en-US" dirty="0"/>
+              <a:t>Ben Ashbaugh (Intel)</a:t>
+            </a:r>
           </a:p>
         </p:txBody>
       </p:sp>
     </p:spTree>
     <p:extLst>
       <p:ext uri="{BB962C8B-B14F-4D97-AF65-F5344CB8AC3E}">
-        <p14:creationId xmlns:p14="http://schemas.microsoft.com/office/powerpoint/2010/main" val="247524480"/>
+        <p14:creationId xmlns:p14="http://schemas.microsoft.com/office/powerpoint/2010/main" val="1217652597"/>
+      </p:ext>
+    </p:extLst>
+  </p:cSld>
+  <p:clrMapOvr>
+    <a:masterClrMapping/>
+  </p:clrMapOvr>
+</p:sld>
+</file>
+
+<file path=ppt/slides/slide10.xml><?xml version="1.0" encoding="utf-8"?>
+<p:sld xmlns:a="http://schemas.openxmlformats.org/drawingml/2006/main" xmlns:r="http://schemas.openxmlformats.org/officeDocument/2006/relationships" xmlns:p="http://schemas.openxmlformats.org/presentationml/2006/main">
+  <p:cSld>
+    <p:spTree>
+      <p:nvGrpSpPr>
+        <p:cNvPr id="1" name=""/>
+        <p:cNvGrpSpPr/>
+        <p:nvPr/>
+      </p:nvGrpSpPr>
+      <p:grpSpPr>
+        <a:xfrm>
+          <a:off x="0" y="0"/>
+          <a:ext cx="0" cy="0"/>
+          <a:chOff x="0" y="0"/>
+          <a:chExt cx="0" cy="0"/>
+        </a:xfrm>
+      </p:grpSpPr>
+      <p:sp>
+        <p:nvSpPr>
+          <p:cNvPr id="4" name="Title 3">
+            <a:extLst>
+              <a:ext uri="{FF2B5EF4-FFF2-40B4-BE49-F238E27FC236}">
+                <a16:creationId xmlns:a16="http://schemas.microsoft.com/office/drawing/2014/main" id="{FB46CC2A-8A9D-4B58-AAC7-1620D43D2E71}"/>
+              </a:ext>
+            </a:extLst>
+          </p:cNvPr>
+          <p:cNvSpPr>
+            <a:spLocks noGrp="1"/>
+          </p:cNvSpPr>
+          <p:nvPr>
+            <p:ph type="title"/>
+          </p:nvPr>
+        </p:nvSpPr>
+        <p:spPr/>
+        <p:txBody>
+          <a:bodyPr/>
+          <a:lstStyle/>
+          <a:p>
+            <a:r>
+              <a:rPr lang="en-US" dirty="0"/>
+              <a:t>Beware the Costs of Offload</a:t>
+            </a:r>
+          </a:p>
+        </p:txBody>
+      </p:sp>
+      <p:sp>
+        <p:nvSpPr>
+          <p:cNvPr id="5" name="Content Placeholder 4">
+            <a:extLst>
+              <a:ext uri="{FF2B5EF4-FFF2-40B4-BE49-F238E27FC236}">
+                <a16:creationId xmlns:a16="http://schemas.microsoft.com/office/drawing/2014/main" id="{DA9881CB-6699-4ACB-B163-52FAE0D2C6F2}"/>
+              </a:ext>
+            </a:extLst>
+          </p:cNvPr>
+          <p:cNvSpPr>
+            <a:spLocks noGrp="1"/>
+          </p:cNvSpPr>
+          <p:nvPr>
+            <p:ph idx="1"/>
+          </p:nvPr>
+        </p:nvSpPr>
+        <p:spPr/>
+        <p:txBody>
+          <a:bodyPr/>
+          <a:lstStyle/>
+          <a:p>
+            <a:r>
+              <a:rPr lang="en-US" dirty="0"/>
+              <a:t>Moving data to or from a GPU is not free</a:t>
+            </a:r>
+          </a:p>
+          <a:p>
+            <a:r>
+              <a:rPr lang="en-US" dirty="0"/>
+              <a:t>Moving an algorithm to or from a GPU is not always profitable</a:t>
+            </a:r>
+          </a:p>
+        </p:txBody>
+      </p:sp>
+      <p:pic>
+        <p:nvPicPr>
+          <p:cNvPr id="7" name="Picture 6">
+            <a:extLst>
+              <a:ext uri="{FF2B5EF4-FFF2-40B4-BE49-F238E27FC236}">
+                <a16:creationId xmlns:a16="http://schemas.microsoft.com/office/drawing/2014/main" id="{49D3DA08-0341-41B2-99B3-A5B85C9E7014}"/>
+              </a:ext>
+            </a:extLst>
+          </p:cNvPr>
+          <p:cNvPicPr>
+            <a:picLocks noChangeAspect="1"/>
+          </p:cNvPicPr>
+          <p:nvPr/>
+        </p:nvPicPr>
+        <p:blipFill>
+          <a:blip r:embed="rId2"/>
+          <a:stretch>
+            <a:fillRect/>
+          </a:stretch>
+        </p:blipFill>
+        <p:spPr>
+          <a:xfrm>
+            <a:off x="3035030" y="2861231"/>
+            <a:ext cx="5914417" cy="3555940"/>
+          </a:xfrm>
+          <a:prstGeom prst="rect">
+            <a:avLst/>
+          </a:prstGeom>
+        </p:spPr>
+      </p:pic>
+    </p:spTree>
+    <p:extLst>
+      <p:ext uri="{BB962C8B-B14F-4D97-AF65-F5344CB8AC3E}">
+        <p14:creationId xmlns:p14="http://schemas.microsoft.com/office/powerpoint/2010/main" val="2834772630"/>
+      </p:ext>
+    </p:extLst>
+  </p:cSld>
+  <p:clrMapOvr>
+    <a:masterClrMapping/>
+  </p:clrMapOvr>
+</p:sld>
+</file>
+
+<file path=ppt/slides/slide11.xml><?xml version="1.0" encoding="utf-8"?>
+<p:sld xmlns:a="http://schemas.openxmlformats.org/drawingml/2006/main" xmlns:r="http://schemas.openxmlformats.org/officeDocument/2006/relationships" xmlns:p="http://schemas.openxmlformats.org/presentationml/2006/main">
+  <p:cSld>
+    <p:spTree>
+      <p:nvGrpSpPr>
+        <p:cNvPr id="1" name=""/>
+        <p:cNvGrpSpPr/>
+        <p:nvPr/>
+      </p:nvGrpSpPr>
+      <p:grpSpPr>
+        <a:xfrm>
+          <a:off x="0" y="0"/>
+          <a:ext cx="0" cy="0"/>
+          <a:chOff x="0" y="0"/>
+          <a:chExt cx="0" cy="0"/>
+        </a:xfrm>
+      </p:grpSpPr>
+      <p:sp>
+        <p:nvSpPr>
+          <p:cNvPr id="2" name="Title 1">
+            <a:extLst>
+              <a:ext uri="{FF2B5EF4-FFF2-40B4-BE49-F238E27FC236}">
+                <a16:creationId xmlns:a16="http://schemas.microsoft.com/office/drawing/2014/main" id="{4840BE34-8488-4BA3-AC74-B6EC07DE039B}"/>
+              </a:ext>
+            </a:extLst>
+          </p:cNvPr>
+          <p:cNvSpPr>
+            <a:spLocks noGrp="1"/>
+          </p:cNvSpPr>
+          <p:nvPr>
+            <p:ph type="title"/>
+          </p:nvPr>
+        </p:nvSpPr>
+        <p:spPr/>
+        <p:txBody>
+          <a:bodyPr/>
+          <a:lstStyle/>
+          <a:p>
+            <a:r>
+              <a:rPr lang="en-US" dirty="0"/>
+              <a:t>Accessing Memory in Kernels</a:t>
+            </a:r>
+          </a:p>
+        </p:txBody>
+      </p:sp>
+      <p:sp>
+        <p:nvSpPr>
+          <p:cNvPr id="3" name="Content Placeholder 2">
+            <a:extLst>
+              <a:ext uri="{FF2B5EF4-FFF2-40B4-BE49-F238E27FC236}">
+                <a16:creationId xmlns:a16="http://schemas.microsoft.com/office/drawing/2014/main" id="{1546C50B-BE03-49E0-B7A9-E569A0EB9461}"/>
+              </a:ext>
+            </a:extLst>
+          </p:cNvPr>
+          <p:cNvSpPr>
+            <a:spLocks noGrp="1"/>
+          </p:cNvSpPr>
+          <p:nvPr>
+            <p:ph idx="1"/>
+          </p:nvPr>
+        </p:nvSpPr>
+        <p:spPr/>
+        <p:txBody>
+          <a:bodyPr/>
+          <a:lstStyle/>
+          <a:p>
+            <a:r>
+              <a:rPr lang="en-US" dirty="0"/>
+              <a:t>Maximize performance by maximizing locality</a:t>
+            </a:r>
+          </a:p>
+          <a:p>
+            <a:r>
+              <a:rPr lang="en-US" dirty="0"/>
+              <a:t>Typically means organizing data structures efficiently</a:t>
+            </a:r>
+          </a:p>
+          <a:p>
+            <a:r>
+              <a:rPr lang="en-US" dirty="0"/>
+              <a:t>Or, choosing the right dimension to parallelize</a:t>
+            </a:r>
+          </a:p>
+          <a:p>
+            <a:r>
+              <a:rPr lang="en-US" dirty="0"/>
+              <a:t>Not sure which dimension is best?  Try both and profile!</a:t>
+            </a:r>
+          </a:p>
+        </p:txBody>
+      </p:sp>
+    </p:spTree>
+    <p:extLst>
+      <p:ext uri="{BB962C8B-B14F-4D97-AF65-F5344CB8AC3E}">
+        <p14:creationId xmlns:p14="http://schemas.microsoft.com/office/powerpoint/2010/main" val="1417485090"/>
+      </p:ext>
+    </p:extLst>
+  </p:cSld>
+  <p:clrMapOvr>
+    <a:masterClrMapping/>
+  </p:clrMapOvr>
+</p:sld>
+</file>
+
+<file path=ppt/slides/slide12.xml><?xml version="1.0" encoding="utf-8"?>
+<p:sld xmlns:a="http://schemas.openxmlformats.org/drawingml/2006/main" xmlns:r="http://schemas.openxmlformats.org/officeDocument/2006/relationships" xmlns:p="http://schemas.openxmlformats.org/presentationml/2006/main">
+  <p:cSld>
+    <p:spTree>
+      <p:nvGrpSpPr>
+        <p:cNvPr id="1" name=""/>
+        <p:cNvGrpSpPr/>
+        <p:nvPr/>
+      </p:nvGrpSpPr>
+      <p:grpSpPr>
+        <a:xfrm>
+          <a:off x="0" y="0"/>
+          <a:ext cx="0" cy="0"/>
+          <a:chOff x="0" y="0"/>
+          <a:chExt cx="0" cy="0"/>
+        </a:xfrm>
+      </p:grpSpPr>
+      <p:sp>
+        <p:nvSpPr>
+          <p:cNvPr id="2" name="Title 1">
+            <a:extLst>
+              <a:ext uri="{FF2B5EF4-FFF2-40B4-BE49-F238E27FC236}">
+                <a16:creationId xmlns:a16="http://schemas.microsoft.com/office/drawing/2014/main" id="{A9CEE9A5-AF37-4DDA-8EFE-14C5B6691664}"/>
+              </a:ext>
+            </a:extLst>
+          </p:cNvPr>
+          <p:cNvSpPr>
+            <a:spLocks noGrp="1"/>
+          </p:cNvSpPr>
+          <p:nvPr>
+            <p:ph type="title"/>
+          </p:nvPr>
+        </p:nvSpPr>
+        <p:spPr/>
+        <p:txBody>
+          <a:bodyPr/>
+          <a:lstStyle/>
+          <a:p>
+            <a:r>
+              <a:rPr lang="en-US" dirty="0"/>
+              <a:t>Bad: Strided Memory Accesses</a:t>
+            </a:r>
+          </a:p>
+        </p:txBody>
+      </p:sp>
+      <p:pic>
+        <p:nvPicPr>
+          <p:cNvPr id="10" name="Content Placeholder 9">
+            <a:extLst>
+              <a:ext uri="{FF2B5EF4-FFF2-40B4-BE49-F238E27FC236}">
+                <a16:creationId xmlns:a16="http://schemas.microsoft.com/office/drawing/2014/main" id="{E9EC487C-E96E-4224-928F-5C4470DB10B1}"/>
+              </a:ext>
+            </a:extLst>
+          </p:cNvPr>
+          <p:cNvPicPr>
+            <a:picLocks noGrp="1" noChangeAspect="1"/>
+          </p:cNvPicPr>
+          <p:nvPr>
+            <p:ph sz="half" idx="2"/>
+          </p:nvPr>
+        </p:nvPicPr>
+        <p:blipFill>
+          <a:blip r:embed="rId2"/>
+          <a:stretch>
+            <a:fillRect/>
+          </a:stretch>
+        </p:blipFill>
+        <p:spPr>
+          <a:xfrm>
+            <a:off x="6492239" y="2670705"/>
+            <a:ext cx="5492237" cy="3499566"/>
+          </a:xfrm>
+        </p:spPr>
+      </p:pic>
+      <p:pic>
+        <p:nvPicPr>
+          <p:cNvPr id="6" name="Content Placeholder 5">
+            <a:extLst>
+              <a:ext uri="{FF2B5EF4-FFF2-40B4-BE49-F238E27FC236}">
+                <a16:creationId xmlns:a16="http://schemas.microsoft.com/office/drawing/2014/main" id="{09782ED8-D5AC-44A4-AA41-C7C64A76E339}"/>
+              </a:ext>
+            </a:extLst>
+          </p:cNvPr>
+          <p:cNvPicPr>
+            <a:picLocks noGrp="1" noChangeAspect="1"/>
+          </p:cNvPicPr>
+          <p:nvPr>
+            <p:ph sz="half" idx="1"/>
+          </p:nvPr>
+        </p:nvPicPr>
+        <p:blipFill>
+          <a:blip r:embed="rId3"/>
+          <a:stretch>
+            <a:fillRect/>
+          </a:stretch>
+        </p:blipFill>
+        <p:spPr>
+          <a:xfrm>
+            <a:off x="838200" y="1978730"/>
+            <a:ext cx="6156314" cy="2778095"/>
+          </a:xfrm>
+        </p:spPr>
+      </p:pic>
+      <p:sp>
+        <p:nvSpPr>
+          <p:cNvPr id="7" name="Rectangle: Rounded Corners 6">
+            <a:extLst>
+              <a:ext uri="{FF2B5EF4-FFF2-40B4-BE49-F238E27FC236}">
+                <a16:creationId xmlns:a16="http://schemas.microsoft.com/office/drawing/2014/main" id="{69A79B4F-C0C9-47DB-8E98-4603CC2F7D34}"/>
+              </a:ext>
+            </a:extLst>
+          </p:cNvPr>
+          <p:cNvSpPr/>
+          <p:nvPr/>
+        </p:nvSpPr>
+        <p:spPr>
+          <a:xfrm>
+            <a:off x="2940435" y="3312068"/>
+            <a:ext cx="1164637" cy="233864"/>
+          </a:xfrm>
+          <a:prstGeom prst="roundRect">
+            <a:avLst/>
+          </a:prstGeom>
+          <a:noFill/>
+          <a:ln w="38100"/>
+        </p:spPr>
+        <p:style>
+          <a:lnRef idx="2">
+            <a:schemeClr val="accent2"/>
+          </a:lnRef>
+          <a:fillRef idx="1">
+            <a:schemeClr val="lt1"/>
+          </a:fillRef>
+          <a:effectRef idx="0">
+            <a:schemeClr val="accent2"/>
+          </a:effectRef>
+          <a:fontRef idx="minor">
+            <a:schemeClr val="dk1"/>
+          </a:fontRef>
+        </p:style>
+        <p:txBody>
+          <a:bodyPr rtlCol="0" anchor="ctr"/>
+          <a:lstStyle/>
+          <a:p>
+            <a:pPr algn="ctr"/>
+            <a:endParaRPr lang="en-US"/>
+          </a:p>
+        </p:txBody>
+      </p:sp>
+      <p:sp>
+        <p:nvSpPr>
+          <p:cNvPr id="8" name="Rectangle: Rounded Corners 7">
+            <a:extLst>
+              <a:ext uri="{FF2B5EF4-FFF2-40B4-BE49-F238E27FC236}">
+                <a16:creationId xmlns:a16="http://schemas.microsoft.com/office/drawing/2014/main" id="{B6518582-C32D-42B9-8322-1751D8672F23}"/>
+              </a:ext>
+            </a:extLst>
+          </p:cNvPr>
+          <p:cNvSpPr/>
+          <p:nvPr/>
+        </p:nvSpPr>
+        <p:spPr>
+          <a:xfrm>
+            <a:off x="1045380" y="2227299"/>
+            <a:ext cx="1600543" cy="233864"/>
+          </a:xfrm>
+          <a:prstGeom prst="roundRect">
+            <a:avLst/>
+          </a:prstGeom>
+          <a:noFill/>
+          <a:ln w="38100"/>
+        </p:spPr>
+        <p:style>
+          <a:lnRef idx="2">
+            <a:schemeClr val="accent2"/>
+          </a:lnRef>
+          <a:fillRef idx="1">
+            <a:schemeClr val="lt1"/>
+          </a:fillRef>
+          <a:effectRef idx="0">
+            <a:schemeClr val="accent2"/>
+          </a:effectRef>
+          <a:fontRef idx="minor">
+            <a:schemeClr val="dk1"/>
+          </a:fontRef>
+        </p:style>
+        <p:txBody>
+          <a:bodyPr rtlCol="0" anchor="ctr"/>
+          <a:lstStyle/>
+          <a:p>
+            <a:pPr algn="ctr"/>
+            <a:endParaRPr lang="en-US"/>
+          </a:p>
+        </p:txBody>
+      </p:sp>
+    </p:spTree>
+    <p:extLst>
+      <p:ext uri="{BB962C8B-B14F-4D97-AF65-F5344CB8AC3E}">
+        <p14:creationId xmlns:p14="http://schemas.microsoft.com/office/powerpoint/2010/main" val="452085810"/>
+      </p:ext>
+    </p:extLst>
+  </p:cSld>
+  <p:clrMapOvr>
+    <a:masterClrMapping/>
+  </p:clrMapOvr>
+</p:sld>
+</file>
+
+<file path=ppt/slides/slide13.xml><?xml version="1.0" encoding="utf-8"?>
+<p:sld xmlns:a="http://schemas.openxmlformats.org/drawingml/2006/main" xmlns:r="http://schemas.openxmlformats.org/officeDocument/2006/relationships" xmlns:p="http://schemas.openxmlformats.org/presentationml/2006/main">
+  <p:cSld>
+    <p:spTree>
+      <p:nvGrpSpPr>
+        <p:cNvPr id="1" name=""/>
+        <p:cNvGrpSpPr/>
+        <p:nvPr/>
+      </p:nvGrpSpPr>
+      <p:grpSpPr>
+        <a:xfrm>
+          <a:off x="0" y="0"/>
+          <a:ext cx="0" cy="0"/>
+          <a:chOff x="0" y="0"/>
+          <a:chExt cx="0" cy="0"/>
+        </a:xfrm>
+      </p:grpSpPr>
+      <p:pic>
+        <p:nvPicPr>
+          <p:cNvPr id="10" name="Content Placeholder 9">
+            <a:extLst>
+              <a:ext uri="{FF2B5EF4-FFF2-40B4-BE49-F238E27FC236}">
+                <a16:creationId xmlns:a16="http://schemas.microsoft.com/office/drawing/2014/main" id="{FF62D859-96A6-4DF5-B572-9D13865CA27A}"/>
+              </a:ext>
+            </a:extLst>
+          </p:cNvPr>
+          <p:cNvPicPr>
+            <a:picLocks noGrp="1" noChangeAspect="1"/>
+          </p:cNvPicPr>
+          <p:nvPr>
+            <p:ph sz="half" idx="2"/>
+          </p:nvPr>
+        </p:nvPicPr>
+        <p:blipFill>
+          <a:blip r:embed="rId2"/>
+          <a:stretch>
+            <a:fillRect/>
+          </a:stretch>
+        </p:blipFill>
+        <p:spPr>
+          <a:xfrm>
+            <a:off x="6663211" y="2901028"/>
+            <a:ext cx="5181600" cy="3591847"/>
+          </a:xfrm>
+        </p:spPr>
+      </p:pic>
+      <p:sp>
+        <p:nvSpPr>
+          <p:cNvPr id="2" name="Title 1">
+            <a:extLst>
+              <a:ext uri="{FF2B5EF4-FFF2-40B4-BE49-F238E27FC236}">
+                <a16:creationId xmlns:a16="http://schemas.microsoft.com/office/drawing/2014/main" id="{50C726B1-9ECA-45B2-9D2C-6E60C93132B2}"/>
+              </a:ext>
+            </a:extLst>
+          </p:cNvPr>
+          <p:cNvSpPr>
+            <a:spLocks noGrp="1"/>
+          </p:cNvSpPr>
+          <p:nvPr>
+            <p:ph type="title"/>
+          </p:nvPr>
+        </p:nvSpPr>
+        <p:spPr/>
+        <p:txBody>
+          <a:bodyPr/>
+          <a:lstStyle/>
+          <a:p>
+            <a:r>
+              <a:rPr lang="en-US" dirty="0"/>
+              <a:t>Good: Contiguous Memory Accesses</a:t>
+            </a:r>
+          </a:p>
+        </p:txBody>
+      </p:sp>
+      <p:pic>
+        <p:nvPicPr>
+          <p:cNvPr id="6" name="Content Placeholder 5">
+            <a:extLst>
+              <a:ext uri="{FF2B5EF4-FFF2-40B4-BE49-F238E27FC236}">
+                <a16:creationId xmlns:a16="http://schemas.microsoft.com/office/drawing/2014/main" id="{65102BDE-9AD8-4550-B76A-FA54F8F68544}"/>
+              </a:ext>
+            </a:extLst>
+          </p:cNvPr>
+          <p:cNvPicPr>
+            <a:picLocks noGrp="1" noChangeAspect="1"/>
+          </p:cNvPicPr>
+          <p:nvPr>
+            <p:ph sz="half" idx="1"/>
+          </p:nvPr>
+        </p:nvPicPr>
+        <p:blipFill>
+          <a:blip r:embed="rId3"/>
+          <a:stretch>
+            <a:fillRect/>
+          </a:stretch>
+        </p:blipFill>
+        <p:spPr>
+          <a:xfrm>
+            <a:off x="347189" y="1789892"/>
+            <a:ext cx="6180738" cy="2743200"/>
+          </a:xfrm>
+        </p:spPr>
+      </p:pic>
+      <p:sp>
+        <p:nvSpPr>
+          <p:cNvPr id="7" name="Rectangle: Rounded Corners 6">
+            <a:extLst>
+              <a:ext uri="{FF2B5EF4-FFF2-40B4-BE49-F238E27FC236}">
+                <a16:creationId xmlns:a16="http://schemas.microsoft.com/office/drawing/2014/main" id="{57E9D644-E42E-452C-A97F-25718F7FC408}"/>
+              </a:ext>
+            </a:extLst>
+          </p:cNvPr>
+          <p:cNvSpPr/>
+          <p:nvPr/>
+        </p:nvSpPr>
+        <p:spPr>
+          <a:xfrm>
+            <a:off x="3305655" y="3021521"/>
+            <a:ext cx="1781911" cy="233864"/>
+          </a:xfrm>
+          <a:prstGeom prst="roundRect">
+            <a:avLst/>
+          </a:prstGeom>
+          <a:noFill/>
+          <a:ln w="38100"/>
+        </p:spPr>
+        <p:style>
+          <a:lnRef idx="2">
+            <a:schemeClr val="accent2"/>
+          </a:lnRef>
+          <a:fillRef idx="1">
+            <a:schemeClr val="lt1"/>
+          </a:fillRef>
+          <a:effectRef idx="0">
+            <a:schemeClr val="accent2"/>
+          </a:effectRef>
+          <a:fontRef idx="minor">
+            <a:schemeClr val="dk1"/>
+          </a:fontRef>
+        </p:style>
+        <p:txBody>
+          <a:bodyPr rtlCol="0" anchor="ctr"/>
+          <a:lstStyle/>
+          <a:p>
+            <a:pPr algn="ctr"/>
+            <a:endParaRPr lang="en-US"/>
+          </a:p>
+        </p:txBody>
+      </p:sp>
+      <p:sp>
+        <p:nvSpPr>
+          <p:cNvPr id="8" name="Rectangle: Rounded Corners 7">
+            <a:extLst>
+              <a:ext uri="{FF2B5EF4-FFF2-40B4-BE49-F238E27FC236}">
+                <a16:creationId xmlns:a16="http://schemas.microsoft.com/office/drawing/2014/main" id="{C1C31E07-4184-4857-9CD9-BE9AC77F4E43}"/>
+              </a:ext>
+            </a:extLst>
+          </p:cNvPr>
+          <p:cNvSpPr/>
+          <p:nvPr/>
+        </p:nvSpPr>
+        <p:spPr>
+          <a:xfrm>
+            <a:off x="488005" y="2135148"/>
+            <a:ext cx="1330960" cy="233864"/>
+          </a:xfrm>
+          <a:prstGeom prst="roundRect">
+            <a:avLst/>
+          </a:prstGeom>
+          <a:noFill/>
+          <a:ln w="38100"/>
+        </p:spPr>
+        <p:style>
+          <a:lnRef idx="2">
+            <a:schemeClr val="accent2"/>
+          </a:lnRef>
+          <a:fillRef idx="1">
+            <a:schemeClr val="lt1"/>
+          </a:fillRef>
+          <a:effectRef idx="0">
+            <a:schemeClr val="accent2"/>
+          </a:effectRef>
+          <a:fontRef idx="minor">
+            <a:schemeClr val="dk1"/>
+          </a:fontRef>
+        </p:style>
+        <p:txBody>
+          <a:bodyPr rtlCol="0" anchor="ctr"/>
+          <a:lstStyle/>
+          <a:p>
+            <a:pPr algn="ctr"/>
+            <a:endParaRPr lang="en-US"/>
+          </a:p>
+        </p:txBody>
+      </p:sp>
+    </p:spTree>
+    <p:extLst>
+      <p:ext uri="{BB962C8B-B14F-4D97-AF65-F5344CB8AC3E}">
+        <p14:creationId xmlns:p14="http://schemas.microsoft.com/office/powerpoint/2010/main" val="1842813080"/>
+      </p:ext>
+    </p:extLst>
+  </p:cSld>
+  <p:clrMapOvr>
+    <a:masterClrMapping/>
+  </p:clrMapOvr>
+</p:sld>
+</file>
+
+<file path=ppt/slides/slide14.xml><?xml version="1.0" encoding="utf-8"?>
+<p:sld xmlns:a="http://schemas.openxmlformats.org/drawingml/2006/main" xmlns:r="http://schemas.openxmlformats.org/officeDocument/2006/relationships" xmlns:p="http://schemas.openxmlformats.org/presentationml/2006/main">
+  <p:cSld>
+    <p:spTree>
+      <p:nvGrpSpPr>
+        <p:cNvPr id="1" name=""/>
+        <p:cNvGrpSpPr/>
+        <p:nvPr/>
+      </p:nvGrpSpPr>
+      <p:grpSpPr>
+        <a:xfrm>
+          <a:off x="0" y="0"/>
+          <a:ext cx="0" cy="0"/>
+          <a:chOff x="0" y="0"/>
+          <a:chExt cx="0" cy="0"/>
+        </a:xfrm>
+      </p:grpSpPr>
+      <p:sp>
+        <p:nvSpPr>
+          <p:cNvPr id="2" name="Title 1">
+            <a:extLst>
+              <a:ext uri="{FF2B5EF4-FFF2-40B4-BE49-F238E27FC236}">
+                <a16:creationId xmlns:a16="http://schemas.microsoft.com/office/drawing/2014/main" id="{7720D440-72F8-4744-8FEF-B0BD77E085E4}"/>
+              </a:ext>
+            </a:extLst>
+          </p:cNvPr>
+          <p:cNvSpPr>
+            <a:spLocks noGrp="1"/>
+          </p:cNvSpPr>
+          <p:nvPr>
+            <p:ph type="title"/>
+          </p:nvPr>
+        </p:nvSpPr>
+        <p:spPr/>
+        <p:txBody>
+          <a:bodyPr/>
+          <a:lstStyle/>
+          <a:p>
+            <a:r>
+              <a:rPr lang="en-US" dirty="0"/>
+              <a:t>Local Memory</a:t>
+            </a:r>
+          </a:p>
+        </p:txBody>
+      </p:sp>
+      <p:sp>
+        <p:nvSpPr>
+          <p:cNvPr id="3" name="Content Placeholder 2">
+            <a:extLst>
+              <a:ext uri="{FF2B5EF4-FFF2-40B4-BE49-F238E27FC236}">
+                <a16:creationId xmlns:a16="http://schemas.microsoft.com/office/drawing/2014/main" id="{54F62EAD-694D-4E2C-8B37-A80638D35C72}"/>
+              </a:ext>
+            </a:extLst>
+          </p:cNvPr>
+          <p:cNvSpPr>
+            <a:spLocks noGrp="1"/>
+          </p:cNvSpPr>
+          <p:nvPr>
+            <p:ph sz="half" idx="1"/>
+          </p:nvPr>
+        </p:nvSpPr>
+        <p:spPr/>
+        <p:txBody>
+          <a:bodyPr/>
+          <a:lstStyle/>
+          <a:p>
+            <a:endParaRPr lang="en-US" dirty="0"/>
+          </a:p>
+          <a:p>
+            <a:pPr marL="0" indent="0">
+              <a:buNone/>
+            </a:pPr>
+            <a:endParaRPr lang="en-US" dirty="0"/>
+          </a:p>
+          <a:p>
+            <a:r>
+              <a:rPr lang="en-US" dirty="0"/>
+              <a:t>Beyond the scope of this talk</a:t>
+            </a:r>
+          </a:p>
+          <a:p>
+            <a:r>
+              <a:rPr lang="en-US" dirty="0"/>
+              <a:t>Know that local memory supports more access patterns efficiently than global memory!</a:t>
+            </a:r>
+          </a:p>
+        </p:txBody>
+      </p:sp>
+      <p:pic>
+        <p:nvPicPr>
+          <p:cNvPr id="6" name="Content Placeholder 5">
+            <a:extLst>
+              <a:ext uri="{FF2B5EF4-FFF2-40B4-BE49-F238E27FC236}">
+                <a16:creationId xmlns:a16="http://schemas.microsoft.com/office/drawing/2014/main" id="{33C35CC9-38FC-45F0-B5EE-FAD42698C363}"/>
+              </a:ext>
+            </a:extLst>
+          </p:cNvPr>
+          <p:cNvPicPr>
+            <a:picLocks noGrp="1" noChangeAspect="1"/>
+          </p:cNvPicPr>
+          <p:nvPr>
+            <p:ph sz="half" idx="2"/>
+          </p:nvPr>
+        </p:nvPicPr>
+        <p:blipFill>
+          <a:blip r:embed="rId2"/>
+          <a:stretch>
+            <a:fillRect/>
+          </a:stretch>
+        </p:blipFill>
+        <p:spPr>
+          <a:xfrm>
+            <a:off x="6172202" y="2101174"/>
+            <a:ext cx="5536970" cy="3552765"/>
+          </a:xfrm>
+        </p:spPr>
+      </p:pic>
+    </p:spTree>
+    <p:extLst>
+      <p:ext uri="{BB962C8B-B14F-4D97-AF65-F5344CB8AC3E}">
+        <p14:creationId xmlns:p14="http://schemas.microsoft.com/office/powerpoint/2010/main" val="1468257985"/>
+      </p:ext>
+    </p:extLst>
+  </p:cSld>
+  <p:clrMapOvr>
+    <a:masterClrMapping/>
+  </p:clrMapOvr>
+</p:sld>
+</file>
+
+<file path=ppt/slides/slide15.xml><?xml version="1.0" encoding="utf-8"?>
+<p:sld xmlns:a="http://schemas.openxmlformats.org/drawingml/2006/main" xmlns:r="http://schemas.openxmlformats.org/officeDocument/2006/relationships" xmlns:p="http://schemas.openxmlformats.org/presentationml/2006/main">
+  <p:cSld>
+    <p:spTree>
+      <p:nvGrpSpPr>
+        <p:cNvPr id="1" name=""/>
+        <p:cNvGrpSpPr/>
+        <p:nvPr/>
+      </p:nvGrpSpPr>
+      <p:grpSpPr>
+        <a:xfrm>
+          <a:off x="0" y="0"/>
+          <a:ext cx="0" cy="0"/>
+          <a:chOff x="0" y="0"/>
+          <a:chExt cx="0" cy="0"/>
+        </a:xfrm>
+      </p:grpSpPr>
+      <p:sp>
+        <p:nvSpPr>
+          <p:cNvPr id="5" name="Title 4">
+            <a:extLst>
+              <a:ext uri="{FF2B5EF4-FFF2-40B4-BE49-F238E27FC236}">
+                <a16:creationId xmlns:a16="http://schemas.microsoft.com/office/drawing/2014/main" id="{1C964DBB-4A5E-4613-8B37-C6C433A22DBA}"/>
+              </a:ext>
+            </a:extLst>
+          </p:cNvPr>
+          <p:cNvSpPr>
+            <a:spLocks noGrp="1"/>
+          </p:cNvSpPr>
+          <p:nvPr>
+            <p:ph type="title"/>
+          </p:nvPr>
+        </p:nvSpPr>
+        <p:spPr/>
+        <p:txBody>
+          <a:bodyPr/>
+          <a:lstStyle/>
+          <a:p>
+            <a:r>
+              <a:rPr lang="en-US" dirty="0"/>
+              <a:t>Compute</a:t>
+            </a:r>
+          </a:p>
+        </p:txBody>
+      </p:sp>
+      <p:sp>
+        <p:nvSpPr>
+          <p:cNvPr id="6" name="Text Placeholder 5">
+            <a:extLst>
+              <a:ext uri="{FF2B5EF4-FFF2-40B4-BE49-F238E27FC236}">
+                <a16:creationId xmlns:a16="http://schemas.microsoft.com/office/drawing/2014/main" id="{34FF01EB-EB30-4092-82D2-AC7E92A38661}"/>
+              </a:ext>
+            </a:extLst>
+          </p:cNvPr>
+          <p:cNvSpPr>
+            <a:spLocks noGrp="1"/>
+          </p:cNvSpPr>
+          <p:nvPr>
+            <p:ph type="body" idx="1"/>
+          </p:nvPr>
+        </p:nvSpPr>
+        <p:spPr/>
+        <p:txBody>
+          <a:bodyPr/>
+          <a:lstStyle/>
+          <a:p>
+            <a:r>
+              <a:rPr lang="en-US" dirty="0"/>
+              <a:t>Cater to GPU strengths!</a:t>
+            </a:r>
+          </a:p>
+        </p:txBody>
+      </p:sp>
+    </p:spTree>
+    <p:extLst>
+      <p:ext uri="{BB962C8B-B14F-4D97-AF65-F5344CB8AC3E}">
+        <p14:creationId xmlns:p14="http://schemas.microsoft.com/office/powerpoint/2010/main" val="106169795"/>
+      </p:ext>
+    </p:extLst>
+  </p:cSld>
+  <p:clrMapOvr>
+    <a:masterClrMapping/>
+  </p:clrMapOvr>
+</p:sld>
+</file>
+
+<file path=ppt/slides/slide16.xml><?xml version="1.0" encoding="utf-8"?>
+<p:sld xmlns:a="http://schemas.openxmlformats.org/drawingml/2006/main" xmlns:r="http://schemas.openxmlformats.org/officeDocument/2006/relationships" xmlns:p="http://schemas.openxmlformats.org/presentationml/2006/main">
+  <p:cSld>
+    <p:spTree>
+      <p:nvGrpSpPr>
+        <p:cNvPr id="1" name=""/>
+        <p:cNvGrpSpPr/>
+        <p:nvPr/>
+      </p:nvGrpSpPr>
+      <p:grpSpPr>
+        <a:xfrm>
+          <a:off x="0" y="0"/>
+          <a:ext cx="0" cy="0"/>
+          <a:chOff x="0" y="0"/>
+          <a:chExt cx="0" cy="0"/>
+        </a:xfrm>
+      </p:grpSpPr>
+      <p:sp>
+        <p:nvSpPr>
+          <p:cNvPr id="4" name="Title 3">
+            <a:extLst>
+              <a:ext uri="{FF2B5EF4-FFF2-40B4-BE49-F238E27FC236}">
+                <a16:creationId xmlns:a16="http://schemas.microsoft.com/office/drawing/2014/main" id="{5F96E361-6747-4094-8C6F-3C54C3B6C5B1}"/>
+              </a:ext>
+            </a:extLst>
+          </p:cNvPr>
+          <p:cNvSpPr>
+            <a:spLocks noGrp="1"/>
+          </p:cNvSpPr>
+          <p:nvPr>
+            <p:ph type="title"/>
+          </p:nvPr>
+        </p:nvSpPr>
+        <p:spPr/>
+        <p:txBody>
+          <a:bodyPr/>
+          <a:lstStyle/>
+          <a:p>
+            <a:r>
+              <a:rPr lang="en-US" dirty="0"/>
+              <a:t>Optimizing for GPU Compute</a:t>
+            </a:r>
+          </a:p>
+        </p:txBody>
+      </p:sp>
+      <p:sp>
+        <p:nvSpPr>
+          <p:cNvPr id="5" name="Content Placeholder 4">
+            <a:extLst>
+              <a:ext uri="{FF2B5EF4-FFF2-40B4-BE49-F238E27FC236}">
+                <a16:creationId xmlns:a16="http://schemas.microsoft.com/office/drawing/2014/main" id="{5DD9767C-15B8-4860-90BD-085A8188381F}"/>
+              </a:ext>
+            </a:extLst>
+          </p:cNvPr>
+          <p:cNvSpPr>
+            <a:spLocks noGrp="1"/>
+          </p:cNvSpPr>
+          <p:nvPr>
+            <p:ph idx="1"/>
+          </p:nvPr>
+        </p:nvSpPr>
+        <p:spPr/>
+        <p:txBody>
+          <a:bodyPr/>
+          <a:lstStyle/>
+          <a:p>
+            <a:r>
+              <a:rPr lang="en-US" dirty="0"/>
+              <a:t>GPUs are traditionally optimized for graphics tasks</a:t>
+            </a:r>
+          </a:p>
+          <a:p>
+            <a:r>
+              <a:rPr lang="en-US" dirty="0"/>
+              <a:t>Typically, 32-bit floating-point math on vertices or pixels</a:t>
+            </a:r>
+          </a:p>
+        </p:txBody>
+      </p:sp>
+    </p:spTree>
+    <p:extLst>
+      <p:ext uri="{BB962C8B-B14F-4D97-AF65-F5344CB8AC3E}">
+        <p14:creationId xmlns:p14="http://schemas.microsoft.com/office/powerpoint/2010/main" val="3907256517"/>
+      </p:ext>
+    </p:extLst>
+  </p:cSld>
+  <p:clrMapOvr>
+    <a:masterClrMapping/>
+  </p:clrMapOvr>
+</p:sld>
+</file>
+
+<file path=ppt/slides/slide17.xml><?xml version="1.0" encoding="utf-8"?>
+<p:sld xmlns:a="http://schemas.openxmlformats.org/drawingml/2006/main" xmlns:r="http://schemas.openxmlformats.org/officeDocument/2006/relationships" xmlns:p="http://schemas.openxmlformats.org/presentationml/2006/main">
+  <p:cSld>
+    <p:spTree>
+      <p:nvGrpSpPr>
+        <p:cNvPr id="1" name=""/>
+        <p:cNvGrpSpPr/>
+        <p:nvPr/>
+      </p:nvGrpSpPr>
+      <p:grpSpPr>
+        <a:xfrm>
+          <a:off x="0" y="0"/>
+          <a:ext cx="0" cy="0"/>
+          <a:chOff x="0" y="0"/>
+          <a:chExt cx="0" cy="0"/>
+        </a:xfrm>
+      </p:grpSpPr>
+      <p:sp>
+        <p:nvSpPr>
+          <p:cNvPr id="2" name="Title 1">
+            <a:extLst>
+              <a:ext uri="{FF2B5EF4-FFF2-40B4-BE49-F238E27FC236}">
+                <a16:creationId xmlns:a16="http://schemas.microsoft.com/office/drawing/2014/main" id="{74159D4F-95CF-4CB6-B84E-83124ECB1FFE}"/>
+              </a:ext>
+            </a:extLst>
+          </p:cNvPr>
+          <p:cNvSpPr>
+            <a:spLocks noGrp="1"/>
+          </p:cNvSpPr>
+          <p:nvPr>
+            <p:ph type="title"/>
+          </p:nvPr>
+        </p:nvSpPr>
+        <p:spPr/>
+        <p:txBody>
+          <a:bodyPr/>
+          <a:lstStyle/>
+          <a:p>
+            <a:r>
+              <a:rPr lang="en-US" dirty="0"/>
+              <a:t>GPU Compute Best Practices</a:t>
+            </a:r>
+          </a:p>
+        </p:txBody>
+      </p:sp>
+      <p:sp>
+        <p:nvSpPr>
+          <p:cNvPr id="3" name="Content Placeholder 2">
+            <a:extLst>
+              <a:ext uri="{FF2B5EF4-FFF2-40B4-BE49-F238E27FC236}">
+                <a16:creationId xmlns:a16="http://schemas.microsoft.com/office/drawing/2014/main" id="{2DCEF4AC-AB46-48F2-97F3-0DF4715C24EA}"/>
+              </a:ext>
+            </a:extLst>
+          </p:cNvPr>
+          <p:cNvSpPr>
+            <a:spLocks noGrp="1"/>
+          </p:cNvSpPr>
+          <p:nvPr>
+            <p:ph idx="1"/>
+          </p:nvPr>
+        </p:nvSpPr>
+        <p:spPr/>
+        <p:txBody>
+          <a:bodyPr/>
+          <a:lstStyle/>
+          <a:p>
+            <a:r>
+              <a:rPr lang="en-US" dirty="0"/>
+              <a:t>Prefer smaller data types, 32-bits or less</a:t>
+            </a:r>
+          </a:p>
+          <a:p>
+            <a:r>
+              <a:rPr lang="en-US" dirty="0"/>
+              <a:t>Some 64-bit data types may be slow or unsupported (e.g., double)</a:t>
+            </a:r>
+          </a:p>
+          <a:p>
+            <a:r>
+              <a:rPr lang="en-US" dirty="0"/>
+              <a:t>Watch for 64-bit address arithmetic, use of 64-bit </a:t>
+            </a:r>
+            <a:r>
+              <a:rPr lang="en-US" dirty="0" err="1"/>
+              <a:t>size_t</a:t>
+            </a:r>
+            <a:endParaRPr lang="en-US" dirty="0"/>
+          </a:p>
+          <a:p>
+            <a:r>
+              <a:rPr lang="en-US" dirty="0"/>
+              <a:t>16-bit or smaller data types may be faster (e.g., half-precision fp16)</a:t>
+            </a:r>
+          </a:p>
+          <a:p>
+            <a:r>
+              <a:rPr lang="en-US" dirty="0"/>
+              <a:t>Use MAD or FMA, don’t disable contractions</a:t>
+            </a:r>
+          </a:p>
+          <a:p>
+            <a:r>
+              <a:rPr lang="en-US" dirty="0"/>
+              <a:t>Trade precision for performance using sycl::native math functions</a:t>
+            </a:r>
+          </a:p>
+          <a:p>
+            <a:r>
+              <a:rPr lang="en-US" dirty="0"/>
+              <a:t>Trade portability for performance using vendor-specific extensions</a:t>
+            </a:r>
+          </a:p>
+        </p:txBody>
+      </p:sp>
+      <p:sp>
+        <p:nvSpPr>
+          <p:cNvPr id="4" name="TextBox 3">
+            <a:extLst>
+              <a:ext uri="{FF2B5EF4-FFF2-40B4-BE49-F238E27FC236}">
+                <a16:creationId xmlns:a16="http://schemas.microsoft.com/office/drawing/2014/main" id="{E32D3E54-30AA-4CF5-8B81-655AD28D8E39}"/>
+              </a:ext>
+            </a:extLst>
+          </p:cNvPr>
+          <p:cNvSpPr txBox="1"/>
+          <p:nvPr/>
+        </p:nvSpPr>
+        <p:spPr>
+          <a:xfrm>
+            <a:off x="838200" y="5750556"/>
+            <a:ext cx="9494843" cy="742319"/>
+          </a:xfrm>
+          <a:prstGeom prst="rect">
+            <a:avLst/>
+          </a:prstGeom>
+          <a:noFill/>
+        </p:spPr>
+        <p:txBody>
+          <a:bodyPr wrap="none" rtlCol="0">
+            <a:spAutoFit/>
+          </a:bodyPr>
+          <a:lstStyle/>
+          <a:p>
+            <a:pPr marL="109538" indent="-109538">
+              <a:lnSpc>
+                <a:spcPct val="88000"/>
+              </a:lnSpc>
+              <a:buFont typeface="Arial" panose="020B0604020202020204" pitchFamily="34" charset="0"/>
+              <a:buChar char="•"/>
+              <a:tabLst>
+                <a:tab pos="109538" algn="l"/>
+              </a:tabLst>
+            </a:pPr>
+            <a:r>
+              <a:rPr lang="en-US" sz="1600" i="0" dirty="0">
+                <a:solidFill>
+                  <a:schemeClr val="bg1">
+                    <a:lumMod val="50000"/>
+                  </a:schemeClr>
+                </a:solidFill>
+                <a:effectLst/>
+              </a:rPr>
+              <a:t>Special operations found in various devices, including GPUs: </a:t>
+            </a:r>
+            <a:r>
+              <a:rPr lang="en-US" sz="1600" b="1" i="0" dirty="0">
+                <a:solidFill>
+                  <a:schemeClr val="bg1">
+                    <a:lumMod val="50000"/>
+                  </a:schemeClr>
+                </a:solidFill>
+                <a:effectLst/>
+              </a:rPr>
+              <a:t>MAD</a:t>
+            </a:r>
+            <a:r>
+              <a:rPr lang="en-US" sz="1600" b="0" i="0" dirty="0">
+                <a:solidFill>
+                  <a:schemeClr val="bg1">
+                    <a:lumMod val="50000"/>
+                  </a:schemeClr>
+                </a:solidFill>
+                <a:effectLst/>
+              </a:rPr>
+              <a:t> = multiply-add;  </a:t>
+            </a:r>
+            <a:r>
+              <a:rPr lang="en-US" sz="1600" b="1" i="0" dirty="0">
+                <a:solidFill>
+                  <a:schemeClr val="bg1">
+                    <a:lumMod val="50000"/>
+                  </a:schemeClr>
+                </a:solidFill>
+                <a:effectLst/>
+              </a:rPr>
+              <a:t>FMA</a:t>
+            </a:r>
+            <a:r>
+              <a:rPr lang="en-US" sz="1600" b="0" i="0" dirty="0">
+                <a:solidFill>
+                  <a:schemeClr val="bg1">
+                    <a:lumMod val="50000"/>
+                  </a:schemeClr>
+                </a:solidFill>
+                <a:effectLst/>
+              </a:rPr>
+              <a:t> = Fused multiply add</a:t>
+            </a:r>
+            <a:br>
+              <a:rPr lang="en-US" sz="1600" b="0" i="0" dirty="0">
+                <a:solidFill>
+                  <a:schemeClr val="bg1">
+                    <a:lumMod val="50000"/>
+                  </a:schemeClr>
+                </a:solidFill>
+                <a:effectLst/>
+              </a:rPr>
+            </a:br>
+            <a:r>
+              <a:rPr lang="en-US" sz="1600" b="0" i="0" dirty="0">
+                <a:solidFill>
+                  <a:schemeClr val="bg1">
+                    <a:lumMod val="50000"/>
+                  </a:schemeClr>
+                </a:solidFill>
+                <a:effectLst/>
+              </a:rPr>
+              <a:t>There use can change the results slightly (typically more accurate, but also different); </a:t>
+            </a:r>
+            <a:br>
+              <a:rPr lang="en-US" sz="1600" b="0" i="0" dirty="0">
+                <a:solidFill>
+                  <a:schemeClr val="bg1">
+                    <a:lumMod val="50000"/>
+                  </a:schemeClr>
+                </a:solidFill>
+                <a:effectLst/>
+              </a:rPr>
+            </a:br>
+            <a:r>
+              <a:rPr lang="en-US" sz="1600" b="0" i="0" dirty="0">
+                <a:solidFill>
+                  <a:schemeClr val="bg1">
+                    <a:lumMod val="50000"/>
+                  </a:schemeClr>
+                </a:solidFill>
+                <a:effectLst/>
+              </a:rPr>
+              <a:t>they are generally </a:t>
+            </a:r>
+            <a:r>
+              <a:rPr lang="en-US" sz="1600" dirty="0">
+                <a:solidFill>
+                  <a:schemeClr val="bg1">
+                    <a:lumMod val="50000"/>
+                  </a:schemeClr>
+                </a:solidFill>
+              </a:rPr>
+              <a:t>are </a:t>
+            </a:r>
+            <a:r>
+              <a:rPr lang="en-US" sz="1600" b="0" i="0" dirty="0">
+                <a:solidFill>
+                  <a:schemeClr val="bg1">
+                    <a:lumMod val="50000"/>
+                  </a:schemeClr>
+                </a:solidFill>
+                <a:effectLst/>
+              </a:rPr>
+              <a:t>much faster than using the individual instructions.</a:t>
+            </a:r>
+            <a:endParaRPr lang="en-US" sz="1600" dirty="0">
+              <a:solidFill>
+                <a:schemeClr val="bg1">
+                  <a:lumMod val="50000"/>
+                </a:schemeClr>
+              </a:solidFill>
+            </a:endParaRPr>
+          </a:p>
+        </p:txBody>
+      </p:sp>
+    </p:spTree>
+    <p:extLst>
+      <p:ext uri="{BB962C8B-B14F-4D97-AF65-F5344CB8AC3E}">
+        <p14:creationId xmlns:p14="http://schemas.microsoft.com/office/powerpoint/2010/main" val="3993520985"/>
+      </p:ext>
+    </p:extLst>
+  </p:cSld>
+  <p:clrMapOvr>
+    <a:masterClrMapping/>
+  </p:clrMapOvr>
+</p:sld>
+</file>
+
+<file path=ppt/slides/slide18.xml><?xml version="1.0" encoding="utf-8"?>
+<p:sld xmlns:a="http://schemas.openxmlformats.org/drawingml/2006/main" xmlns:r="http://schemas.openxmlformats.org/officeDocument/2006/relationships" xmlns:p="http://schemas.openxmlformats.org/presentationml/2006/main">
+  <p:cSld>
+    <p:spTree>
+      <p:nvGrpSpPr>
+        <p:cNvPr id="1" name=""/>
+        <p:cNvGrpSpPr/>
+        <p:nvPr/>
+      </p:nvGrpSpPr>
+      <p:grpSpPr>
+        <a:xfrm>
+          <a:off x="0" y="0"/>
+          <a:ext cx="0" cy="0"/>
+          <a:chOff x="0" y="0"/>
+          <a:chExt cx="0" cy="0"/>
+        </a:xfrm>
+      </p:grpSpPr>
+      <p:sp>
+        <p:nvSpPr>
+          <p:cNvPr id="4" name="Title 3">
+            <a:extLst>
+              <a:ext uri="{FF2B5EF4-FFF2-40B4-BE49-F238E27FC236}">
+                <a16:creationId xmlns:a16="http://schemas.microsoft.com/office/drawing/2014/main" id="{C97A2296-C626-421C-A56A-5A8146DDC8BC}"/>
+              </a:ext>
+            </a:extLst>
+          </p:cNvPr>
+          <p:cNvSpPr>
+            <a:spLocks noGrp="1"/>
+          </p:cNvSpPr>
+          <p:nvPr>
+            <p:ph type="title"/>
+          </p:nvPr>
+        </p:nvSpPr>
+        <p:spPr/>
+        <p:txBody>
+          <a:bodyPr/>
+          <a:lstStyle/>
+          <a:p>
+            <a:r>
+              <a:rPr lang="en-US" dirty="0"/>
+              <a:t>Summary and Recap</a:t>
+            </a:r>
+          </a:p>
+        </p:txBody>
+      </p:sp>
+    </p:spTree>
+    <p:extLst>
+      <p:ext uri="{BB962C8B-B14F-4D97-AF65-F5344CB8AC3E}">
+        <p14:creationId xmlns:p14="http://schemas.microsoft.com/office/powerpoint/2010/main" val="2152089164"/>
+      </p:ext>
+    </p:extLst>
+  </p:cSld>
+  <p:clrMapOvr>
+    <a:masterClrMapping/>
+  </p:clrMapOvr>
+</p:sld>
+</file>
+
+<file path=ppt/slides/slide19.xml><?xml version="1.0" encoding="utf-8"?>
+<p:sld xmlns:a="http://schemas.openxmlformats.org/drawingml/2006/main" xmlns:r="http://schemas.openxmlformats.org/officeDocument/2006/relationships" xmlns:p="http://schemas.openxmlformats.org/presentationml/2006/main">
+  <p:cSld>
+    <p:spTree>
+      <p:nvGrpSpPr>
+        <p:cNvPr id="1" name=""/>
+        <p:cNvGrpSpPr/>
+        <p:nvPr/>
+      </p:nvGrpSpPr>
+      <p:grpSpPr>
+        <a:xfrm>
+          <a:off x="0" y="0"/>
+          <a:ext cx="0" cy="0"/>
+          <a:chOff x="0" y="0"/>
+          <a:chExt cx="0" cy="0"/>
+        </a:xfrm>
+      </p:grpSpPr>
+      <p:sp>
+        <p:nvSpPr>
+          <p:cNvPr id="4" name="Title 3">
+            <a:extLst>
+              <a:ext uri="{FF2B5EF4-FFF2-40B4-BE49-F238E27FC236}">
+                <a16:creationId xmlns:a16="http://schemas.microsoft.com/office/drawing/2014/main" id="{E572AD9E-1346-49DD-9B29-3D76756EB01F}"/>
+              </a:ext>
+            </a:extLst>
+          </p:cNvPr>
+          <p:cNvSpPr>
+            <a:spLocks noGrp="1"/>
+          </p:cNvSpPr>
+          <p:nvPr>
+            <p:ph type="title"/>
+          </p:nvPr>
+        </p:nvSpPr>
+        <p:spPr/>
+        <p:txBody>
+          <a:bodyPr/>
+          <a:lstStyle/>
+          <a:p>
+            <a:r>
+              <a:rPr lang="en-US" dirty="0"/>
+              <a:t>Summary</a:t>
+            </a:r>
+          </a:p>
+        </p:txBody>
+      </p:sp>
+      <p:sp>
+        <p:nvSpPr>
+          <p:cNvPr id="5" name="Content Placeholder 4">
+            <a:extLst>
+              <a:ext uri="{FF2B5EF4-FFF2-40B4-BE49-F238E27FC236}">
+                <a16:creationId xmlns:a16="http://schemas.microsoft.com/office/drawing/2014/main" id="{CB352A9F-04DB-4954-8360-FD876CBA10A2}"/>
+              </a:ext>
+            </a:extLst>
+          </p:cNvPr>
+          <p:cNvSpPr>
+            <a:spLocks noGrp="1"/>
+          </p:cNvSpPr>
+          <p:nvPr>
+            <p:ph idx="1"/>
+          </p:nvPr>
+        </p:nvSpPr>
+        <p:spPr>
+          <a:xfrm>
+            <a:off x="838200" y="1825624"/>
+            <a:ext cx="10515600" cy="4773295"/>
+          </a:xfrm>
+        </p:spPr>
+        <p:txBody>
+          <a:bodyPr>
+            <a:normAutofit/>
+          </a:bodyPr>
+          <a:lstStyle/>
+          <a:p>
+            <a:r>
+              <a:rPr lang="en-US" dirty="0"/>
+              <a:t>GPUs are massively parallel throughput devices</a:t>
+            </a:r>
+          </a:p>
+          <a:p>
+            <a:pPr lvl="1"/>
+            <a:r>
+              <a:rPr lang="en-US" dirty="0"/>
+              <a:t>Important to give a GPU lots of work, thousands or millions of work-items</a:t>
+            </a:r>
+          </a:p>
+          <a:p>
+            <a:r>
+              <a:rPr lang="en-US" dirty="0"/>
+              <a:t>Optimize Memory First</a:t>
+            </a:r>
+          </a:p>
+          <a:p>
+            <a:pPr lvl="1"/>
+            <a:r>
+              <a:rPr lang="en-US" dirty="0"/>
+              <a:t>Monitor and minimize data transfer costs to or from the GPU</a:t>
+            </a:r>
+          </a:p>
+          <a:p>
+            <a:pPr lvl="1"/>
+            <a:r>
+              <a:rPr lang="en-US" dirty="0"/>
+              <a:t>Improve performance by rearrange data or computation for locality</a:t>
+            </a:r>
+          </a:p>
+          <a:p>
+            <a:r>
+              <a:rPr lang="en-US" dirty="0"/>
+              <a:t>Optimize Compute Next</a:t>
+            </a:r>
+          </a:p>
+          <a:p>
+            <a:pPr lvl="1"/>
+            <a:r>
+              <a:rPr lang="en-US" dirty="0"/>
+              <a:t>Prefer smaller data types, trade precision for performance</a:t>
+            </a:r>
+          </a:p>
+          <a:p>
+            <a:pPr lvl="1"/>
+            <a:endParaRPr lang="en-US" dirty="0"/>
+          </a:p>
+          <a:p>
+            <a:r>
+              <a:rPr lang="en-US" dirty="0"/>
+              <a:t>Thank you!</a:t>
+            </a:r>
+          </a:p>
+          <a:p>
+            <a:pPr marL="457200" lvl="1" indent="0">
+              <a:buNone/>
+            </a:pPr>
+            <a:r>
+              <a:rPr lang="en-US" dirty="0">
+                <a:hlinkClick r:id="rId2"/>
+              </a:rPr>
+              <a:t>ben.ashbaugh@intel.com</a:t>
+            </a:r>
+            <a:r>
+              <a:rPr lang="en-US" dirty="0"/>
+              <a:t>,         @bashbaug</a:t>
+            </a:r>
+          </a:p>
+        </p:txBody>
+      </p:sp>
+      <p:pic>
+        <p:nvPicPr>
+          <p:cNvPr id="7" name="Picture 6" descr="A picture containing ax, vector graphics, tool&#10;&#10;Description automatically generated">
+            <a:extLst>
+              <a:ext uri="{FF2B5EF4-FFF2-40B4-BE49-F238E27FC236}">
+                <a16:creationId xmlns:a16="http://schemas.microsoft.com/office/drawing/2014/main" id="{B8724D41-5B48-4161-BF30-6ED9C0F60314}"/>
+              </a:ext>
+            </a:extLst>
+          </p:cNvPr>
+          <p:cNvPicPr>
+            <a:picLocks noChangeAspect="1"/>
+          </p:cNvPicPr>
+          <p:nvPr/>
+        </p:nvPicPr>
+        <p:blipFill>
+          <a:blip r:embed="rId3">
+            <a:extLst>
+              <a:ext uri="{28A0092B-C50C-407E-A947-70E740481C1C}">
+                <a14:useLocalDpi xmlns:a14="http://schemas.microsoft.com/office/drawing/2010/main" val="0"/>
+              </a:ext>
+            </a:extLst>
+          </a:blip>
+          <a:stretch>
+            <a:fillRect/>
+          </a:stretch>
+        </p:blipFill>
+        <p:spPr>
+          <a:xfrm>
+            <a:off x="4746511" y="5791200"/>
+            <a:ext cx="446268" cy="367286"/>
+          </a:xfrm>
+          <a:prstGeom prst="rect">
+            <a:avLst/>
+          </a:prstGeom>
+        </p:spPr>
+      </p:pic>
+    </p:spTree>
+    <p:extLst>
+      <p:ext uri="{BB962C8B-B14F-4D97-AF65-F5344CB8AC3E}">
+        <p14:creationId xmlns:p14="http://schemas.microsoft.com/office/powerpoint/2010/main" val="622483751"/>
+      </p:ext>
+    </p:extLst>
+  </p:cSld>
+  <p:clrMapOvr>
+    <a:masterClrMapping/>
+  </p:clrMapOvr>
+</p:sld>
+</file>
+
+<file path=ppt/slides/slide2.xml><?xml version="1.0" encoding="utf-8"?>
+<p:sld xmlns:a="http://schemas.openxmlformats.org/drawingml/2006/main" xmlns:r="http://schemas.openxmlformats.org/officeDocument/2006/relationships" xmlns:p="http://schemas.openxmlformats.org/presentationml/2006/main">
+  <p:cSld>
+    <p:spTree>
+      <p:nvGrpSpPr>
+        <p:cNvPr id="1" name=""/>
+        <p:cNvGrpSpPr/>
+        <p:nvPr/>
+      </p:nvGrpSpPr>
+      <p:grpSpPr>
+        <a:xfrm>
+          <a:off x="0" y="0"/>
+          <a:ext cx="0" cy="0"/>
+          <a:chOff x="0" y="0"/>
+          <a:chExt cx="0" cy="0"/>
+        </a:xfrm>
+      </p:grpSpPr>
+      <p:sp>
+        <p:nvSpPr>
+          <p:cNvPr id="4" name="Title 3">
+            <a:extLst>
+              <a:ext uri="{FF2B5EF4-FFF2-40B4-BE49-F238E27FC236}">
+                <a16:creationId xmlns:a16="http://schemas.microsoft.com/office/drawing/2014/main" id="{22DA53CF-CDE0-4161-A0D3-52451980151C}"/>
+              </a:ext>
+            </a:extLst>
+          </p:cNvPr>
+          <p:cNvSpPr>
+            <a:spLocks noGrp="1"/>
+          </p:cNvSpPr>
+          <p:nvPr>
+            <p:ph type="title"/>
+          </p:nvPr>
+        </p:nvSpPr>
+        <p:spPr/>
+        <p:txBody>
+          <a:bodyPr/>
+          <a:lstStyle/>
+          <a:p>
+            <a:r>
+              <a:rPr lang="en-US" dirty="0"/>
+              <a:t>Occupancy</a:t>
+            </a:r>
+          </a:p>
+        </p:txBody>
+      </p:sp>
+      <p:sp>
+        <p:nvSpPr>
+          <p:cNvPr id="5" name="Text Placeholder 4">
+            <a:extLst>
+              <a:ext uri="{FF2B5EF4-FFF2-40B4-BE49-F238E27FC236}">
+                <a16:creationId xmlns:a16="http://schemas.microsoft.com/office/drawing/2014/main" id="{7C0248E2-EFBB-4A83-878A-A4BA0FD9FFA2}"/>
+              </a:ext>
+            </a:extLst>
+          </p:cNvPr>
+          <p:cNvSpPr>
+            <a:spLocks noGrp="1"/>
+          </p:cNvSpPr>
+          <p:nvPr>
+            <p:ph type="body" idx="1"/>
+          </p:nvPr>
+        </p:nvSpPr>
+        <p:spPr/>
+        <p:txBody>
+          <a:bodyPr/>
+          <a:lstStyle/>
+          <a:p>
+            <a:r>
+              <a:rPr lang="en-US" dirty="0"/>
+              <a:t>Give the GPU enough work!</a:t>
+            </a:r>
+          </a:p>
+        </p:txBody>
+      </p:sp>
+    </p:spTree>
+    <p:extLst>
+      <p:ext uri="{BB962C8B-B14F-4D97-AF65-F5344CB8AC3E}">
+        <p14:creationId xmlns:p14="http://schemas.microsoft.com/office/powerpoint/2010/main" val="2438840291"/>
+      </p:ext>
+    </p:extLst>
+  </p:cSld>
+  <p:clrMapOvr>
+    <a:masterClrMapping/>
+  </p:clrMapOvr>
+</p:sld>
+</file>
+
+<file path=ppt/slides/slide3.xml><?xml version="1.0" encoding="utf-8"?>
+<p:sld xmlns:a="http://schemas.openxmlformats.org/drawingml/2006/main" xmlns:r="http://schemas.openxmlformats.org/officeDocument/2006/relationships" xmlns:p="http://schemas.openxmlformats.org/presentationml/2006/main">
+  <p:cSld>
+    <p:spTree>
+      <p:nvGrpSpPr>
+        <p:cNvPr id="1" name=""/>
+        <p:cNvGrpSpPr/>
+        <p:nvPr/>
+      </p:nvGrpSpPr>
+      <p:grpSpPr>
+        <a:xfrm>
+          <a:off x="0" y="0"/>
+          <a:ext cx="0" cy="0"/>
+          <a:chOff x="0" y="0"/>
+          <a:chExt cx="0" cy="0"/>
+        </a:xfrm>
+      </p:grpSpPr>
+      <p:sp>
+        <p:nvSpPr>
+          <p:cNvPr id="4" name="Title 3">
+            <a:extLst>
+              <a:ext uri="{FF2B5EF4-FFF2-40B4-BE49-F238E27FC236}">
+                <a16:creationId xmlns:a16="http://schemas.microsoft.com/office/drawing/2014/main" id="{0EF0D3FF-6241-49FE-96BD-56DB565AEBC1}"/>
+              </a:ext>
+            </a:extLst>
+          </p:cNvPr>
+          <p:cNvSpPr>
+            <a:spLocks noGrp="1"/>
+          </p:cNvSpPr>
+          <p:nvPr>
+            <p:ph type="title"/>
+          </p:nvPr>
+        </p:nvSpPr>
+        <p:spPr/>
+        <p:txBody>
+          <a:bodyPr/>
+          <a:lstStyle/>
+          <a:p>
+            <a:r>
+              <a:rPr lang="en-US" dirty="0"/>
+              <a:t>GPU != CPU</a:t>
+            </a:r>
+          </a:p>
+        </p:txBody>
+      </p:sp>
+      <p:sp>
+        <p:nvSpPr>
+          <p:cNvPr id="5" name="Content Placeholder 4">
+            <a:extLst>
+              <a:ext uri="{FF2B5EF4-FFF2-40B4-BE49-F238E27FC236}">
+                <a16:creationId xmlns:a16="http://schemas.microsoft.com/office/drawing/2014/main" id="{D530F38F-1B82-4B15-80AA-21CE44E088E5}"/>
+              </a:ext>
+            </a:extLst>
+          </p:cNvPr>
+          <p:cNvSpPr>
+            <a:spLocks noGrp="1"/>
+          </p:cNvSpPr>
+          <p:nvPr>
+            <p:ph sz="half" idx="1"/>
+          </p:nvPr>
+        </p:nvSpPr>
+        <p:spPr/>
+        <p:txBody>
+          <a:bodyPr/>
+          <a:lstStyle/>
+          <a:p>
+            <a:r>
+              <a:rPr lang="en-US" dirty="0"/>
+              <a:t>CPUs: Optimized for latency</a:t>
+            </a:r>
+          </a:p>
+          <a:p>
+            <a:pPr lvl="1"/>
+            <a:r>
+              <a:rPr lang="en-US" dirty="0"/>
+              <a:t>Fewer fancier processors</a:t>
+            </a:r>
+          </a:p>
+          <a:p>
+            <a:pPr marL="0" indent="0">
+              <a:buNone/>
+            </a:pPr>
+            <a:endParaRPr lang="en-US" dirty="0"/>
+          </a:p>
+        </p:txBody>
+      </p:sp>
+      <p:sp>
+        <p:nvSpPr>
+          <p:cNvPr id="6" name="Content Placeholder 5">
+            <a:extLst>
+              <a:ext uri="{FF2B5EF4-FFF2-40B4-BE49-F238E27FC236}">
+                <a16:creationId xmlns:a16="http://schemas.microsoft.com/office/drawing/2014/main" id="{A92F1A64-28F9-432F-8103-2D860CDEA6EC}"/>
+              </a:ext>
+            </a:extLst>
+          </p:cNvPr>
+          <p:cNvSpPr>
+            <a:spLocks noGrp="1"/>
+          </p:cNvSpPr>
+          <p:nvPr>
+            <p:ph sz="half" idx="2"/>
+          </p:nvPr>
+        </p:nvSpPr>
+        <p:spPr/>
+        <p:txBody>
+          <a:bodyPr/>
+          <a:lstStyle/>
+          <a:p>
+            <a:r>
+              <a:rPr lang="en-US" dirty="0"/>
+              <a:t>GPUs: Optimized for throughput</a:t>
+            </a:r>
+          </a:p>
+          <a:p>
+            <a:pPr lvl="1"/>
+            <a:r>
+              <a:rPr lang="en-US" dirty="0"/>
+              <a:t>Many simpler processors</a:t>
+            </a:r>
+          </a:p>
+          <a:p>
+            <a:endParaRPr lang="en-US" dirty="0"/>
+          </a:p>
+        </p:txBody>
+      </p:sp>
+      <p:pic>
+        <p:nvPicPr>
+          <p:cNvPr id="8" name="Picture 7">
+            <a:extLst>
+              <a:ext uri="{FF2B5EF4-FFF2-40B4-BE49-F238E27FC236}">
+                <a16:creationId xmlns:a16="http://schemas.microsoft.com/office/drawing/2014/main" id="{555CBFAE-2D91-4DCF-9AAA-51C3895F5C38}"/>
+              </a:ext>
+            </a:extLst>
+          </p:cNvPr>
+          <p:cNvPicPr>
+            <a:picLocks noChangeAspect="1"/>
+          </p:cNvPicPr>
+          <p:nvPr/>
+        </p:nvPicPr>
+        <p:blipFill>
+          <a:blip r:embed="rId2"/>
+          <a:stretch>
+            <a:fillRect/>
+          </a:stretch>
+        </p:blipFill>
+        <p:spPr>
+          <a:xfrm>
+            <a:off x="2279873" y="2837947"/>
+            <a:ext cx="7479853" cy="3654928"/>
+          </a:xfrm>
+          <a:prstGeom prst="rect">
+            <a:avLst/>
+          </a:prstGeom>
+        </p:spPr>
+      </p:pic>
+    </p:spTree>
+    <p:extLst>
+      <p:ext uri="{BB962C8B-B14F-4D97-AF65-F5344CB8AC3E}">
+        <p14:creationId xmlns:p14="http://schemas.microsoft.com/office/powerpoint/2010/main" val="1952717894"/>
+      </p:ext>
+    </p:extLst>
+  </p:cSld>
+  <p:clrMapOvr>
+    <a:masterClrMapping/>
+  </p:clrMapOvr>
+</p:sld>
+</file>
+
+<file path=ppt/slides/slide4.xml><?xml version="1.0" encoding="utf-8"?>
+<p:sld xmlns:a="http://schemas.openxmlformats.org/drawingml/2006/main" xmlns:r="http://schemas.openxmlformats.org/officeDocument/2006/relationships" xmlns:p="http://schemas.openxmlformats.org/presentationml/2006/main">
+  <p:cSld>
+    <p:spTree>
+      <p:nvGrpSpPr>
+        <p:cNvPr id="1" name=""/>
+        <p:cNvGrpSpPr/>
+        <p:nvPr/>
+      </p:nvGrpSpPr>
+      <p:grpSpPr>
+        <a:xfrm>
+          <a:off x="0" y="0"/>
+          <a:ext cx="0" cy="0"/>
+          <a:chOff x="0" y="0"/>
+          <a:chExt cx="0" cy="0"/>
+        </a:xfrm>
+      </p:grpSpPr>
+      <p:sp>
+        <p:nvSpPr>
+          <p:cNvPr id="5" name="Title 4">
+            <a:extLst>
+              <a:ext uri="{FF2B5EF4-FFF2-40B4-BE49-F238E27FC236}">
+                <a16:creationId xmlns:a16="http://schemas.microsoft.com/office/drawing/2014/main" id="{810A0819-036F-40F7-9312-CEA66117C792}"/>
+              </a:ext>
+            </a:extLst>
+          </p:cNvPr>
+          <p:cNvSpPr>
+            <a:spLocks noGrp="1"/>
+          </p:cNvSpPr>
+          <p:nvPr>
+            <p:ph type="title"/>
+          </p:nvPr>
+        </p:nvSpPr>
+        <p:spPr/>
+        <p:txBody>
+          <a:bodyPr/>
+          <a:lstStyle/>
+          <a:p>
+            <a:r>
+              <a:rPr lang="en-US" dirty="0"/>
+              <a:t>GPUs need lots of data!</a:t>
+            </a:r>
+          </a:p>
+        </p:txBody>
+      </p:sp>
+      <p:sp>
+        <p:nvSpPr>
+          <p:cNvPr id="6" name="Content Placeholder 5">
+            <a:extLst>
+              <a:ext uri="{FF2B5EF4-FFF2-40B4-BE49-F238E27FC236}">
+                <a16:creationId xmlns:a16="http://schemas.microsoft.com/office/drawing/2014/main" id="{5FC634AE-64D3-407E-867F-408F91FEB423}"/>
+              </a:ext>
+            </a:extLst>
+          </p:cNvPr>
+          <p:cNvSpPr>
+            <a:spLocks noGrp="1"/>
+          </p:cNvSpPr>
+          <p:nvPr>
+            <p:ph idx="1"/>
+          </p:nvPr>
+        </p:nvSpPr>
+        <p:spPr/>
+        <p:txBody>
+          <a:bodyPr/>
+          <a:lstStyle/>
+          <a:p>
+            <a:r>
+              <a:rPr lang="en-US" dirty="0"/>
+              <a:t>Graphics and games requires processing millions of pixels per second</a:t>
+            </a:r>
+          </a:p>
+          <a:p>
+            <a:r>
+              <a:rPr lang="en-US" dirty="0"/>
+              <a:t>GPUs prefer many work-items for general-purpose computation</a:t>
+            </a:r>
+          </a:p>
+          <a:p>
+            <a:r>
+              <a:rPr lang="en-US" dirty="0"/>
+              <a:t>Many work-items keeps GPU execution resources busy (occupied)!</a:t>
+            </a:r>
+          </a:p>
+        </p:txBody>
+      </p:sp>
+    </p:spTree>
+    <p:extLst>
+      <p:ext uri="{BB962C8B-B14F-4D97-AF65-F5344CB8AC3E}">
+        <p14:creationId xmlns:p14="http://schemas.microsoft.com/office/powerpoint/2010/main" val="2430250862"/>
+      </p:ext>
+    </p:extLst>
+  </p:cSld>
+  <p:clrMapOvr>
+    <a:masterClrMapping/>
+  </p:clrMapOvr>
+</p:sld>
+</file>
+
+<file path=ppt/slides/slide5.xml><?xml version="1.0" encoding="utf-8"?>
+<p:sld xmlns:a="http://schemas.openxmlformats.org/drawingml/2006/main" xmlns:r="http://schemas.openxmlformats.org/officeDocument/2006/relationships" xmlns:p="http://schemas.openxmlformats.org/presentationml/2006/main">
+  <p:cSld>
+    <p:spTree>
+      <p:nvGrpSpPr>
+        <p:cNvPr id="1" name=""/>
+        <p:cNvGrpSpPr/>
+        <p:nvPr/>
+      </p:nvGrpSpPr>
+      <p:grpSpPr>
+        <a:xfrm>
+          <a:off x="0" y="0"/>
+          <a:ext cx="0" cy="0"/>
+          <a:chOff x="0" y="0"/>
+          <a:chExt cx="0" cy="0"/>
+        </a:xfrm>
+      </p:grpSpPr>
+      <p:sp>
+        <p:nvSpPr>
+          <p:cNvPr id="2" name="Title 1">
+            <a:extLst>
+              <a:ext uri="{FF2B5EF4-FFF2-40B4-BE49-F238E27FC236}">
+                <a16:creationId xmlns:a16="http://schemas.microsoft.com/office/drawing/2014/main" id="{60D9A1E1-F10E-46C4-A44E-03FD310A57F4}"/>
+              </a:ext>
+            </a:extLst>
+          </p:cNvPr>
+          <p:cNvSpPr>
+            <a:spLocks noGrp="1"/>
+          </p:cNvSpPr>
+          <p:nvPr>
+            <p:ph type="title"/>
+          </p:nvPr>
+        </p:nvSpPr>
+        <p:spPr/>
+        <p:txBody>
+          <a:bodyPr/>
+          <a:lstStyle/>
+          <a:p>
+            <a:r>
+              <a:rPr lang="en-US" dirty="0"/>
+              <a:t>Bad: Not Enough Parallelism</a:t>
+            </a:r>
+          </a:p>
+        </p:txBody>
+      </p:sp>
+      <p:pic>
+        <p:nvPicPr>
+          <p:cNvPr id="7" name="Content Placeholder 6">
+            <a:extLst>
+              <a:ext uri="{FF2B5EF4-FFF2-40B4-BE49-F238E27FC236}">
+                <a16:creationId xmlns:a16="http://schemas.microsoft.com/office/drawing/2014/main" id="{72A04610-2884-4418-B5C7-7BDFAF2F23A4}"/>
+              </a:ext>
+            </a:extLst>
+          </p:cNvPr>
+          <p:cNvPicPr>
+            <a:picLocks noGrp="1" noChangeAspect="1"/>
+          </p:cNvPicPr>
+          <p:nvPr>
+            <p:ph sz="half" idx="1"/>
+          </p:nvPr>
+        </p:nvPicPr>
+        <p:blipFill>
+          <a:blip r:embed="rId2"/>
+          <a:stretch>
+            <a:fillRect/>
+          </a:stretch>
+        </p:blipFill>
+        <p:spPr>
+          <a:xfrm>
+            <a:off x="398313" y="2122857"/>
+            <a:ext cx="5908682" cy="2361410"/>
+          </a:xfrm>
+        </p:spPr>
+      </p:pic>
+      <p:pic>
+        <p:nvPicPr>
+          <p:cNvPr id="9" name="Content Placeholder 8">
+            <a:extLst>
+              <a:ext uri="{FF2B5EF4-FFF2-40B4-BE49-F238E27FC236}">
+                <a16:creationId xmlns:a16="http://schemas.microsoft.com/office/drawing/2014/main" id="{98E1FF9C-7ADB-4D55-BA9A-11CCEDF17455}"/>
+              </a:ext>
+            </a:extLst>
+          </p:cNvPr>
+          <p:cNvPicPr>
+            <a:picLocks noGrp="1" noChangeAspect="1"/>
+          </p:cNvPicPr>
+          <p:nvPr>
+            <p:ph sz="half" idx="2"/>
+          </p:nvPr>
+        </p:nvPicPr>
+        <p:blipFill>
+          <a:blip r:embed="rId3"/>
+          <a:stretch>
+            <a:fillRect/>
+          </a:stretch>
+        </p:blipFill>
+        <p:spPr>
+          <a:xfrm>
+            <a:off x="6498484" y="3471213"/>
+            <a:ext cx="5181600" cy="2574764"/>
+          </a:xfrm>
+        </p:spPr>
+      </p:pic>
+      <p:sp>
+        <p:nvSpPr>
+          <p:cNvPr id="10" name="Rectangle: Rounded Corners 9">
+            <a:extLst>
+              <a:ext uri="{FF2B5EF4-FFF2-40B4-BE49-F238E27FC236}">
+                <a16:creationId xmlns:a16="http://schemas.microsoft.com/office/drawing/2014/main" id="{E297BF78-7F82-490E-984C-5E6F3D676F80}"/>
+              </a:ext>
+            </a:extLst>
+          </p:cNvPr>
+          <p:cNvSpPr/>
+          <p:nvPr/>
+        </p:nvSpPr>
+        <p:spPr>
+          <a:xfrm>
+            <a:off x="398314" y="2103401"/>
+            <a:ext cx="1958180" cy="231237"/>
+          </a:xfrm>
+          <a:prstGeom prst="roundRect">
+            <a:avLst/>
+          </a:prstGeom>
+          <a:noFill/>
+          <a:ln w="38100"/>
+        </p:spPr>
+        <p:style>
+          <a:lnRef idx="2">
+            <a:schemeClr val="accent2"/>
+          </a:lnRef>
+          <a:fillRef idx="1">
+            <a:schemeClr val="lt1"/>
+          </a:fillRef>
+          <a:effectRef idx="0">
+            <a:schemeClr val="accent2"/>
+          </a:effectRef>
+          <a:fontRef idx="minor">
+            <a:schemeClr val="dk1"/>
+          </a:fontRef>
+        </p:style>
+        <p:txBody>
+          <a:bodyPr rtlCol="0" anchor="ctr"/>
+          <a:lstStyle/>
+          <a:p>
+            <a:pPr algn="ctr"/>
+            <a:endParaRPr lang="en-US"/>
+          </a:p>
+        </p:txBody>
+      </p:sp>
+    </p:spTree>
+    <p:extLst>
+      <p:ext uri="{BB962C8B-B14F-4D97-AF65-F5344CB8AC3E}">
+        <p14:creationId xmlns:p14="http://schemas.microsoft.com/office/powerpoint/2010/main" val="1400799503"/>
+      </p:ext>
+    </p:extLst>
+  </p:cSld>
+  <p:clrMapOvr>
+    <a:masterClrMapping/>
+  </p:clrMapOvr>
+</p:sld>
+</file>
+
+<file path=ppt/slides/slide6.xml><?xml version="1.0" encoding="utf-8"?>
+<p:sld xmlns:a="http://schemas.openxmlformats.org/drawingml/2006/main" xmlns:r="http://schemas.openxmlformats.org/officeDocument/2006/relationships" xmlns:p="http://schemas.openxmlformats.org/presentationml/2006/main">
+  <p:cSld>
+    <p:spTree>
+      <p:nvGrpSpPr>
+        <p:cNvPr id="1" name=""/>
+        <p:cNvGrpSpPr/>
+        <p:nvPr/>
+      </p:nvGrpSpPr>
+      <p:grpSpPr>
+        <a:xfrm>
+          <a:off x="0" y="0"/>
+          <a:ext cx="0" cy="0"/>
+          <a:chOff x="0" y="0"/>
+          <a:chExt cx="0" cy="0"/>
+        </a:xfrm>
+      </p:grpSpPr>
+      <p:sp>
+        <p:nvSpPr>
+          <p:cNvPr id="2" name="Title 1">
+            <a:extLst>
+              <a:ext uri="{FF2B5EF4-FFF2-40B4-BE49-F238E27FC236}">
+                <a16:creationId xmlns:a16="http://schemas.microsoft.com/office/drawing/2014/main" id="{4978B6A0-B114-4A7D-9ADF-9A0A3FD55F0E}"/>
+              </a:ext>
+            </a:extLst>
+          </p:cNvPr>
+          <p:cNvSpPr>
+            <a:spLocks noGrp="1"/>
+          </p:cNvSpPr>
+          <p:nvPr>
+            <p:ph type="title"/>
+          </p:nvPr>
+        </p:nvSpPr>
+        <p:spPr/>
+        <p:txBody>
+          <a:bodyPr/>
+          <a:lstStyle/>
+          <a:p>
+            <a:r>
+              <a:rPr lang="en-US" dirty="0"/>
+              <a:t>Better: More Parallelism</a:t>
+            </a:r>
+          </a:p>
+        </p:txBody>
+      </p:sp>
+      <p:pic>
+        <p:nvPicPr>
+          <p:cNvPr id="6" name="Content Placeholder 5">
+            <a:extLst>
+              <a:ext uri="{FF2B5EF4-FFF2-40B4-BE49-F238E27FC236}">
+                <a16:creationId xmlns:a16="http://schemas.microsoft.com/office/drawing/2014/main" id="{2300B94A-035F-443E-8755-99E78AB1FC7F}"/>
+              </a:ext>
+            </a:extLst>
+          </p:cNvPr>
+          <p:cNvPicPr>
+            <a:picLocks noGrp="1" noChangeAspect="1"/>
+          </p:cNvPicPr>
+          <p:nvPr>
+            <p:ph sz="half" idx="1"/>
+          </p:nvPr>
+        </p:nvPicPr>
+        <p:blipFill>
+          <a:blip r:embed="rId2"/>
+          <a:stretch>
+            <a:fillRect/>
+          </a:stretch>
+        </p:blipFill>
+        <p:spPr>
+          <a:xfrm>
+            <a:off x="295492" y="1690688"/>
+            <a:ext cx="6057976" cy="2733719"/>
+          </a:xfrm>
+        </p:spPr>
+      </p:pic>
+      <p:pic>
+        <p:nvPicPr>
+          <p:cNvPr id="8" name="Content Placeholder 7">
+            <a:extLst>
+              <a:ext uri="{FF2B5EF4-FFF2-40B4-BE49-F238E27FC236}">
+                <a16:creationId xmlns:a16="http://schemas.microsoft.com/office/drawing/2014/main" id="{034CA85A-B79E-468C-8865-2CE806C05995}"/>
+              </a:ext>
+            </a:extLst>
+          </p:cNvPr>
+          <p:cNvPicPr>
+            <a:picLocks noGrp="1" noChangeAspect="1"/>
+          </p:cNvPicPr>
+          <p:nvPr>
+            <p:ph sz="half" idx="2"/>
+          </p:nvPr>
+        </p:nvPicPr>
+        <p:blipFill>
+          <a:blip r:embed="rId3"/>
+          <a:stretch>
+            <a:fillRect/>
+          </a:stretch>
+        </p:blipFill>
+        <p:spPr>
+          <a:xfrm>
+            <a:off x="6353468" y="3514450"/>
+            <a:ext cx="5181600" cy="2609141"/>
+          </a:xfrm>
+        </p:spPr>
+      </p:pic>
+      <p:sp>
+        <p:nvSpPr>
+          <p:cNvPr id="9" name="Rectangle: Rounded Corners 8">
+            <a:extLst>
+              <a:ext uri="{FF2B5EF4-FFF2-40B4-BE49-F238E27FC236}">
+                <a16:creationId xmlns:a16="http://schemas.microsoft.com/office/drawing/2014/main" id="{0DB50C7B-65CD-4F7D-A482-DF130ED66FD6}"/>
+              </a:ext>
+            </a:extLst>
+          </p:cNvPr>
+          <p:cNvSpPr/>
+          <p:nvPr/>
+        </p:nvSpPr>
+        <p:spPr>
+          <a:xfrm>
+            <a:off x="162755" y="1709389"/>
+            <a:ext cx="4506521" cy="498789"/>
+          </a:xfrm>
+          <a:prstGeom prst="roundRect">
+            <a:avLst/>
+          </a:prstGeom>
+          <a:noFill/>
+          <a:ln w="38100"/>
+        </p:spPr>
+        <p:style>
+          <a:lnRef idx="2">
+            <a:schemeClr val="accent2"/>
+          </a:lnRef>
+          <a:fillRef idx="1">
+            <a:schemeClr val="lt1"/>
+          </a:fillRef>
+          <a:effectRef idx="0">
+            <a:schemeClr val="accent2"/>
+          </a:effectRef>
+          <a:fontRef idx="minor">
+            <a:schemeClr val="dk1"/>
+          </a:fontRef>
+        </p:style>
+        <p:txBody>
+          <a:bodyPr rtlCol="0" anchor="ctr"/>
+          <a:lstStyle/>
+          <a:p>
+            <a:pPr algn="ctr"/>
+            <a:endParaRPr lang="en-US"/>
+          </a:p>
+        </p:txBody>
+      </p:sp>
+    </p:spTree>
+    <p:extLst>
+      <p:ext uri="{BB962C8B-B14F-4D97-AF65-F5344CB8AC3E}">
+        <p14:creationId xmlns:p14="http://schemas.microsoft.com/office/powerpoint/2010/main" val="2408983685"/>
+      </p:ext>
+    </p:extLst>
+  </p:cSld>
+  <p:clrMapOvr>
+    <a:masterClrMapping/>
+  </p:clrMapOvr>
+</p:sld>
+</file>
+
+<file path=ppt/slides/slide7.xml><?xml version="1.0" encoding="utf-8"?>
+<p:sld xmlns:a="http://schemas.openxmlformats.org/drawingml/2006/main" xmlns:r="http://schemas.openxmlformats.org/officeDocument/2006/relationships" xmlns:p="http://schemas.openxmlformats.org/presentationml/2006/main">
+  <p:cSld>
+    <p:spTree>
+      <p:nvGrpSpPr>
+        <p:cNvPr id="1" name=""/>
+        <p:cNvGrpSpPr/>
+        <p:nvPr/>
+      </p:nvGrpSpPr>
+      <p:grpSpPr>
+        <a:xfrm>
+          <a:off x="0" y="0"/>
+          <a:ext cx="0" cy="0"/>
+          <a:chOff x="0" y="0"/>
+          <a:chExt cx="0" cy="0"/>
+        </a:xfrm>
+      </p:grpSpPr>
+      <p:sp>
+        <p:nvSpPr>
+          <p:cNvPr id="5" name="Title 4">
+            <a:extLst>
+              <a:ext uri="{FF2B5EF4-FFF2-40B4-BE49-F238E27FC236}">
+                <a16:creationId xmlns:a16="http://schemas.microsoft.com/office/drawing/2014/main" id="{D4C25632-05BD-43F5-80CC-CC55F9899251}"/>
+              </a:ext>
+            </a:extLst>
+          </p:cNvPr>
+          <p:cNvSpPr>
+            <a:spLocks noGrp="1"/>
+          </p:cNvSpPr>
+          <p:nvPr>
+            <p:ph type="title"/>
+          </p:nvPr>
+        </p:nvSpPr>
+        <p:spPr/>
+        <p:txBody>
+          <a:bodyPr/>
+          <a:lstStyle/>
+          <a:p>
+            <a:r>
+              <a:rPr lang="en-US" dirty="0"/>
+              <a:t>More Parallelism is Even Better!</a:t>
+            </a:r>
+          </a:p>
+        </p:txBody>
+      </p:sp>
+      <p:pic>
+        <p:nvPicPr>
+          <p:cNvPr id="14" name="Content Placeholder 13">
+            <a:extLst>
+              <a:ext uri="{FF2B5EF4-FFF2-40B4-BE49-F238E27FC236}">
+                <a16:creationId xmlns:a16="http://schemas.microsoft.com/office/drawing/2014/main" id="{F7599F64-2DF5-4A9B-9449-8FC0BF8F354A}"/>
+              </a:ext>
+            </a:extLst>
+          </p:cNvPr>
+          <p:cNvPicPr>
+            <a:picLocks noGrp="1" noChangeAspect="1"/>
+          </p:cNvPicPr>
+          <p:nvPr>
+            <p:ph idx="1"/>
+          </p:nvPr>
+        </p:nvPicPr>
+        <p:blipFill>
+          <a:blip r:embed="rId2"/>
+          <a:stretch>
+            <a:fillRect/>
+          </a:stretch>
+        </p:blipFill>
+        <p:spPr>
+          <a:xfrm>
+            <a:off x="2302638" y="2317572"/>
+            <a:ext cx="7264324" cy="2805036"/>
+          </a:xfrm>
+        </p:spPr>
+      </p:pic>
+      <p:sp>
+        <p:nvSpPr>
+          <p:cNvPr id="15" name="Rectangle: Rounded Corners 14">
+            <a:extLst>
+              <a:ext uri="{FF2B5EF4-FFF2-40B4-BE49-F238E27FC236}">
+                <a16:creationId xmlns:a16="http://schemas.microsoft.com/office/drawing/2014/main" id="{B680C96D-7F78-4484-898A-D18D02326B54}"/>
+              </a:ext>
+            </a:extLst>
+          </p:cNvPr>
+          <p:cNvSpPr/>
+          <p:nvPr/>
+        </p:nvSpPr>
+        <p:spPr>
+          <a:xfrm>
+            <a:off x="2289209" y="2280311"/>
+            <a:ext cx="5638276" cy="821398"/>
+          </a:xfrm>
+          <a:prstGeom prst="roundRect">
+            <a:avLst/>
+          </a:prstGeom>
+          <a:noFill/>
+          <a:ln w="38100"/>
+        </p:spPr>
+        <p:style>
+          <a:lnRef idx="2">
+            <a:schemeClr val="accent2"/>
+          </a:lnRef>
+          <a:fillRef idx="1">
+            <a:schemeClr val="lt1"/>
+          </a:fillRef>
+          <a:effectRef idx="0">
+            <a:schemeClr val="accent2"/>
+          </a:effectRef>
+          <a:fontRef idx="minor">
+            <a:schemeClr val="dk1"/>
+          </a:fontRef>
+        </p:style>
+        <p:txBody>
+          <a:bodyPr rtlCol="0" anchor="ctr"/>
+          <a:lstStyle/>
+          <a:p>
+            <a:pPr algn="ctr"/>
+            <a:endParaRPr lang="en-US"/>
+          </a:p>
+        </p:txBody>
+      </p:sp>
+    </p:spTree>
+    <p:extLst>
+      <p:ext uri="{BB962C8B-B14F-4D97-AF65-F5344CB8AC3E}">
+        <p14:creationId xmlns:p14="http://schemas.microsoft.com/office/powerpoint/2010/main" val="1500951581"/>
+      </p:ext>
+    </p:extLst>
+  </p:cSld>
+  <p:clrMapOvr>
+    <a:masterClrMapping/>
+  </p:clrMapOvr>
+</p:sld>
+</file>
+
+<file path=ppt/slides/slide8.xml><?xml version="1.0" encoding="utf-8"?>
+<p:sld xmlns:a="http://schemas.openxmlformats.org/drawingml/2006/main" xmlns:r="http://schemas.openxmlformats.org/officeDocument/2006/relationships" xmlns:p="http://schemas.openxmlformats.org/presentationml/2006/main">
+  <p:cSld>
+    <p:spTree>
+      <p:nvGrpSpPr>
+        <p:cNvPr id="1" name=""/>
+        <p:cNvGrpSpPr/>
+        <p:nvPr/>
+      </p:nvGrpSpPr>
+      <p:grpSpPr>
+        <a:xfrm>
+          <a:off x="0" y="0"/>
+          <a:ext cx="0" cy="0"/>
+          <a:chOff x="0" y="0"/>
+          <a:chExt cx="0" cy="0"/>
+        </a:xfrm>
+      </p:grpSpPr>
+      <p:sp>
+        <p:nvSpPr>
+          <p:cNvPr id="2" name="Title 1">
+            <a:extLst>
+              <a:ext uri="{FF2B5EF4-FFF2-40B4-BE49-F238E27FC236}">
+                <a16:creationId xmlns:a16="http://schemas.microsoft.com/office/drawing/2014/main" id="{A1AFE291-DF29-4D0B-BC8D-18E7C74C66A3}"/>
+              </a:ext>
+            </a:extLst>
+          </p:cNvPr>
+          <p:cNvSpPr>
+            <a:spLocks noGrp="1"/>
+          </p:cNvSpPr>
+          <p:nvPr>
+            <p:ph type="title"/>
+          </p:nvPr>
+        </p:nvSpPr>
+        <p:spPr/>
+        <p:txBody>
+          <a:bodyPr/>
+          <a:lstStyle/>
+          <a:p>
+            <a:r>
+              <a:rPr lang="en-US" dirty="0"/>
+              <a:t>Why is so much parallelism important?</a:t>
+            </a:r>
+          </a:p>
+        </p:txBody>
+      </p:sp>
+      <p:sp>
+        <p:nvSpPr>
+          <p:cNvPr id="3" name="Content Placeholder 2">
+            <a:extLst>
+              <a:ext uri="{FF2B5EF4-FFF2-40B4-BE49-F238E27FC236}">
+                <a16:creationId xmlns:a16="http://schemas.microsoft.com/office/drawing/2014/main" id="{0E580C43-53BD-4B2F-B2D0-1A3926F025D8}"/>
+              </a:ext>
+            </a:extLst>
+          </p:cNvPr>
+          <p:cNvSpPr>
+            <a:spLocks noGrp="1"/>
+          </p:cNvSpPr>
+          <p:nvPr>
+            <p:ph idx="1"/>
+          </p:nvPr>
+        </p:nvSpPr>
+        <p:spPr/>
+        <p:txBody>
+          <a:bodyPr/>
+          <a:lstStyle/>
+          <a:p>
+            <a:r>
+              <a:rPr lang="en-US" dirty="0"/>
+              <a:t>In addition to keeping processing elements busy…</a:t>
+            </a:r>
+          </a:p>
+          <a:p>
+            <a:endParaRPr lang="en-US" dirty="0"/>
+          </a:p>
+        </p:txBody>
+      </p:sp>
+      <p:pic>
+        <p:nvPicPr>
+          <p:cNvPr id="5" name="Picture 4">
+            <a:extLst>
+              <a:ext uri="{FF2B5EF4-FFF2-40B4-BE49-F238E27FC236}">
+                <a16:creationId xmlns:a16="http://schemas.microsoft.com/office/drawing/2014/main" id="{1B514EC1-5B51-4050-A0DD-8E5B39935C0C}"/>
+              </a:ext>
+            </a:extLst>
+          </p:cNvPr>
+          <p:cNvPicPr>
+            <a:picLocks noChangeAspect="1"/>
+          </p:cNvPicPr>
+          <p:nvPr/>
+        </p:nvPicPr>
+        <p:blipFill>
+          <a:blip r:embed="rId2"/>
+          <a:stretch>
+            <a:fillRect/>
+          </a:stretch>
+        </p:blipFill>
+        <p:spPr>
+          <a:xfrm>
+            <a:off x="648552" y="4036491"/>
+            <a:ext cx="5101614" cy="2383763"/>
+          </a:xfrm>
+          <a:prstGeom prst="rect">
+            <a:avLst/>
+          </a:prstGeom>
+        </p:spPr>
+      </p:pic>
+      <p:sp>
+        <p:nvSpPr>
+          <p:cNvPr id="6" name="Content Placeholder 4">
+            <a:extLst>
+              <a:ext uri="{FF2B5EF4-FFF2-40B4-BE49-F238E27FC236}">
+                <a16:creationId xmlns:a16="http://schemas.microsoft.com/office/drawing/2014/main" id="{E6115ADA-1058-4DAB-AC07-DD1A91CF7E2D}"/>
+              </a:ext>
+            </a:extLst>
+          </p:cNvPr>
+          <p:cNvSpPr txBox="1">
+            <a:spLocks/>
+          </p:cNvSpPr>
+          <p:nvPr/>
+        </p:nvSpPr>
+        <p:spPr>
+          <a:xfrm>
+            <a:off x="838200" y="2550160"/>
+            <a:ext cx="5181600" cy="3626802"/>
+          </a:xfrm>
+          <a:prstGeom prst="rect">
+            <a:avLst/>
+          </a:prstGeom>
+        </p:spPr>
+        <p:txBody>
+          <a:bodyPr vert="horz" lIns="91440" tIns="45720" rIns="91440" bIns="45720" rtlCol="0">
+            <a:normAutofit/>
+          </a:bodyPr>
+          <a:lstStyle>
+            <a:lvl1pPr marL="228600" indent="-228600" algn="l" defTabSz="914400" rtl="0" eaLnBrk="1" latinLnBrk="0" hangingPunct="1">
+              <a:lnSpc>
+                <a:spcPct val="90000"/>
+              </a:lnSpc>
+              <a:spcBef>
+                <a:spcPts val="1000"/>
+              </a:spcBef>
+              <a:buFont typeface="Arial" panose="020B0604020202020204" pitchFamily="34" charset="0"/>
+              <a:buChar char="•"/>
+              <a:defRPr sz="2800" kern="1200">
+                <a:solidFill>
+                  <a:schemeClr val="tx1"/>
+                </a:solidFill>
+                <a:latin typeface="+mn-lt"/>
+                <a:ea typeface="+mn-ea"/>
+                <a:cs typeface="+mn-cs"/>
+              </a:defRPr>
+            </a:lvl1pPr>
+            <a:lvl2pPr marL="685800" indent="-228600" algn="l" defTabSz="914400" rtl="0" eaLnBrk="1" latinLnBrk="0" hangingPunct="1">
+              <a:lnSpc>
+                <a:spcPct val="90000"/>
+              </a:lnSpc>
+              <a:spcBef>
+                <a:spcPts val="500"/>
+              </a:spcBef>
+              <a:buFont typeface="Arial" panose="020B0604020202020204" pitchFamily="34" charset="0"/>
+              <a:buChar char="•"/>
+              <a:defRPr sz="2400" kern="1200">
+                <a:solidFill>
+                  <a:schemeClr val="tx1"/>
+                </a:solidFill>
+                <a:latin typeface="+mn-lt"/>
+                <a:ea typeface="+mn-ea"/>
+                <a:cs typeface="+mn-cs"/>
+              </a:defRPr>
+            </a:lvl2pPr>
+            <a:lvl3pPr marL="1143000" indent="-228600" algn="l" defTabSz="914400" rtl="0" eaLnBrk="1" latinLnBrk="0" hangingPunct="1">
+              <a:lnSpc>
+                <a:spcPct val="90000"/>
+              </a:lnSpc>
+              <a:spcBef>
+                <a:spcPts val="500"/>
+              </a:spcBef>
+              <a:buFont typeface="Arial" panose="020B0604020202020204" pitchFamily="34" charset="0"/>
+              <a:buChar char="•"/>
+              <a:defRPr sz="2000" kern="1200">
+                <a:solidFill>
+                  <a:schemeClr val="tx1"/>
+                </a:solidFill>
+                <a:latin typeface="+mn-lt"/>
+                <a:ea typeface="+mn-ea"/>
+                <a:cs typeface="+mn-cs"/>
+              </a:defRPr>
+            </a:lvl3pPr>
+            <a:lvl4pPr marL="1600200" indent="-228600" algn="l" defTabSz="914400" rtl="0" eaLnBrk="1" latinLnBrk="0" hangingPunct="1">
+              <a:lnSpc>
+                <a:spcPct val="90000"/>
+              </a:lnSpc>
+              <a:spcBef>
+                <a:spcPts val="500"/>
+              </a:spcBef>
+              <a:buFont typeface="Arial" panose="020B0604020202020204" pitchFamily="34" charset="0"/>
+              <a:buChar char="•"/>
+              <a:defRPr sz="1800" kern="1200">
+                <a:solidFill>
+                  <a:schemeClr val="tx1"/>
+                </a:solidFill>
+                <a:latin typeface="+mn-lt"/>
+                <a:ea typeface="+mn-ea"/>
+                <a:cs typeface="+mn-cs"/>
+              </a:defRPr>
+            </a:lvl4pPr>
+            <a:lvl5pPr marL="2057400" indent="-228600" algn="l" defTabSz="914400" rtl="0" eaLnBrk="1" latinLnBrk="0" hangingPunct="1">
+              <a:lnSpc>
+                <a:spcPct val="90000"/>
+              </a:lnSpc>
+              <a:spcBef>
+                <a:spcPts val="500"/>
+              </a:spcBef>
+              <a:buFont typeface="Arial" panose="020B0604020202020204" pitchFamily="34" charset="0"/>
+              <a:buChar char="•"/>
+              <a:defRPr sz="1800" kern="1200">
+                <a:solidFill>
+                  <a:schemeClr val="tx1"/>
+                </a:solidFill>
+                <a:latin typeface="+mn-lt"/>
+                <a:ea typeface="+mn-ea"/>
+                <a:cs typeface="+mn-cs"/>
+              </a:defRPr>
+            </a:lvl5pPr>
+            <a:lvl6pPr marL="2514600" indent="-228600" algn="l" defTabSz="914400" rtl="0" eaLnBrk="1" latinLnBrk="0" hangingPunct="1">
+              <a:lnSpc>
+                <a:spcPct val="90000"/>
+              </a:lnSpc>
+              <a:spcBef>
+                <a:spcPts val="500"/>
+              </a:spcBef>
+              <a:buFont typeface="Arial" panose="020B0604020202020204" pitchFamily="34" charset="0"/>
+              <a:buChar char="•"/>
+              <a:defRPr sz="1800" kern="1200">
+                <a:solidFill>
+                  <a:schemeClr val="tx1"/>
+                </a:solidFill>
+                <a:latin typeface="+mn-lt"/>
+                <a:ea typeface="+mn-ea"/>
+                <a:cs typeface="+mn-cs"/>
+              </a:defRPr>
+            </a:lvl6pPr>
+            <a:lvl7pPr marL="2971800" indent="-228600" algn="l" defTabSz="914400" rtl="0" eaLnBrk="1" latinLnBrk="0" hangingPunct="1">
+              <a:lnSpc>
+                <a:spcPct val="90000"/>
+              </a:lnSpc>
+              <a:spcBef>
+                <a:spcPts val="500"/>
+              </a:spcBef>
+              <a:buFont typeface="Arial" panose="020B0604020202020204" pitchFamily="34" charset="0"/>
+              <a:buChar char="•"/>
+              <a:defRPr sz="1800" kern="1200">
+                <a:solidFill>
+                  <a:schemeClr val="tx1"/>
+                </a:solidFill>
+                <a:latin typeface="+mn-lt"/>
+                <a:ea typeface="+mn-ea"/>
+                <a:cs typeface="+mn-cs"/>
+              </a:defRPr>
+            </a:lvl7pPr>
+            <a:lvl8pPr marL="3429000" indent="-228600" algn="l" defTabSz="914400" rtl="0" eaLnBrk="1" latinLnBrk="0" hangingPunct="1">
+              <a:lnSpc>
+                <a:spcPct val="90000"/>
+              </a:lnSpc>
+              <a:spcBef>
+                <a:spcPts val="500"/>
+              </a:spcBef>
+              <a:buFont typeface="Arial" panose="020B0604020202020204" pitchFamily="34" charset="0"/>
+              <a:buChar char="•"/>
+              <a:defRPr sz="1800" kern="1200">
+                <a:solidFill>
+                  <a:schemeClr val="tx1"/>
+                </a:solidFill>
+                <a:latin typeface="+mn-lt"/>
+                <a:ea typeface="+mn-ea"/>
+                <a:cs typeface="+mn-cs"/>
+              </a:defRPr>
+            </a:lvl8pPr>
+            <a:lvl9pPr marL="3886200" indent="-228600" algn="l" defTabSz="914400" rtl="0" eaLnBrk="1" latinLnBrk="0" hangingPunct="1">
+              <a:lnSpc>
+                <a:spcPct val="90000"/>
+              </a:lnSpc>
+              <a:spcBef>
+                <a:spcPts val="500"/>
+              </a:spcBef>
+              <a:buFont typeface="Arial" panose="020B0604020202020204" pitchFamily="34" charset="0"/>
+              <a:buChar char="•"/>
+              <a:defRPr sz="1800" kern="1200">
+                <a:solidFill>
+                  <a:schemeClr val="tx1"/>
+                </a:solidFill>
+                <a:latin typeface="+mn-lt"/>
+                <a:ea typeface="+mn-ea"/>
+                <a:cs typeface="+mn-cs"/>
+              </a:defRPr>
+            </a:lvl9pPr>
+          </a:lstStyle>
+          <a:p>
+            <a:r>
+              <a:rPr lang="en-US" dirty="0"/>
+              <a:t>Many GPU processors operate on multiple data elements simultaneously:</a:t>
+            </a:r>
+          </a:p>
+        </p:txBody>
+      </p:sp>
+      <p:sp>
+        <p:nvSpPr>
+          <p:cNvPr id="7" name="Content Placeholder 5">
+            <a:extLst>
+              <a:ext uri="{FF2B5EF4-FFF2-40B4-BE49-F238E27FC236}">
+                <a16:creationId xmlns:a16="http://schemas.microsoft.com/office/drawing/2014/main" id="{2EE78414-F700-4802-A9E3-2E1B83AB581D}"/>
+              </a:ext>
+            </a:extLst>
+          </p:cNvPr>
+          <p:cNvSpPr txBox="1">
+            <a:spLocks/>
+          </p:cNvSpPr>
+          <p:nvPr/>
+        </p:nvSpPr>
+        <p:spPr>
+          <a:xfrm>
+            <a:off x="6172200" y="2550160"/>
+            <a:ext cx="5181600" cy="3626802"/>
+          </a:xfrm>
+          <a:prstGeom prst="rect">
+            <a:avLst/>
+          </a:prstGeom>
+        </p:spPr>
+        <p:txBody>
+          <a:bodyPr/>
+          <a:lstStyle>
+            <a:lvl1pPr marL="228600" indent="-228600" algn="l" defTabSz="914400" rtl="0" eaLnBrk="1" latinLnBrk="0" hangingPunct="1">
+              <a:lnSpc>
+                <a:spcPct val="90000"/>
+              </a:lnSpc>
+              <a:spcBef>
+                <a:spcPts val="1000"/>
+              </a:spcBef>
+              <a:buFont typeface="Arial" panose="020B0604020202020204" pitchFamily="34" charset="0"/>
+              <a:buChar char="•"/>
+              <a:defRPr sz="2800" kern="1200">
+                <a:solidFill>
+                  <a:schemeClr val="tx1"/>
+                </a:solidFill>
+                <a:latin typeface="+mn-lt"/>
+                <a:ea typeface="+mn-ea"/>
+                <a:cs typeface="+mn-cs"/>
+              </a:defRPr>
+            </a:lvl1pPr>
+            <a:lvl2pPr marL="685800" indent="-228600" algn="l" defTabSz="914400" rtl="0" eaLnBrk="1" latinLnBrk="0" hangingPunct="1">
+              <a:lnSpc>
+                <a:spcPct val="90000"/>
+              </a:lnSpc>
+              <a:spcBef>
+                <a:spcPts val="500"/>
+              </a:spcBef>
+              <a:buFont typeface="Arial" panose="020B0604020202020204" pitchFamily="34" charset="0"/>
+              <a:buChar char="•"/>
+              <a:defRPr sz="2400" kern="1200">
+                <a:solidFill>
+                  <a:schemeClr val="tx1"/>
+                </a:solidFill>
+                <a:latin typeface="+mn-lt"/>
+                <a:ea typeface="+mn-ea"/>
+                <a:cs typeface="+mn-cs"/>
+              </a:defRPr>
+            </a:lvl2pPr>
+            <a:lvl3pPr marL="1143000" indent="-228600" algn="l" defTabSz="914400" rtl="0" eaLnBrk="1" latinLnBrk="0" hangingPunct="1">
+              <a:lnSpc>
+                <a:spcPct val="90000"/>
+              </a:lnSpc>
+              <a:spcBef>
+                <a:spcPts val="500"/>
+              </a:spcBef>
+              <a:buFont typeface="Arial" panose="020B0604020202020204" pitchFamily="34" charset="0"/>
+              <a:buChar char="•"/>
+              <a:defRPr sz="2000" kern="1200">
+                <a:solidFill>
+                  <a:schemeClr val="tx1"/>
+                </a:solidFill>
+                <a:latin typeface="+mn-lt"/>
+                <a:ea typeface="+mn-ea"/>
+                <a:cs typeface="+mn-cs"/>
+              </a:defRPr>
+            </a:lvl3pPr>
+            <a:lvl4pPr marL="1600200" indent="-228600" algn="l" defTabSz="914400" rtl="0" eaLnBrk="1" latinLnBrk="0" hangingPunct="1">
+              <a:lnSpc>
+                <a:spcPct val="90000"/>
+              </a:lnSpc>
+              <a:spcBef>
+                <a:spcPts val="500"/>
+              </a:spcBef>
+              <a:buFont typeface="Arial" panose="020B0604020202020204" pitchFamily="34" charset="0"/>
+              <a:buChar char="•"/>
+              <a:defRPr sz="1800" kern="1200">
+                <a:solidFill>
+                  <a:schemeClr val="tx1"/>
+                </a:solidFill>
+                <a:latin typeface="+mn-lt"/>
+                <a:ea typeface="+mn-ea"/>
+                <a:cs typeface="+mn-cs"/>
+              </a:defRPr>
+            </a:lvl4pPr>
+            <a:lvl5pPr marL="2057400" indent="-228600" algn="l" defTabSz="914400" rtl="0" eaLnBrk="1" latinLnBrk="0" hangingPunct="1">
+              <a:lnSpc>
+                <a:spcPct val="90000"/>
+              </a:lnSpc>
+              <a:spcBef>
+                <a:spcPts val="500"/>
+              </a:spcBef>
+              <a:buFont typeface="Arial" panose="020B0604020202020204" pitchFamily="34" charset="0"/>
+              <a:buChar char="•"/>
+              <a:defRPr sz="1800" kern="1200">
+                <a:solidFill>
+                  <a:schemeClr val="tx1"/>
+                </a:solidFill>
+                <a:latin typeface="+mn-lt"/>
+                <a:ea typeface="+mn-ea"/>
+                <a:cs typeface="+mn-cs"/>
+              </a:defRPr>
+            </a:lvl5pPr>
+            <a:lvl6pPr marL="2514600" indent="-228600" algn="l" defTabSz="914400" rtl="0" eaLnBrk="1" latinLnBrk="0" hangingPunct="1">
+              <a:lnSpc>
+                <a:spcPct val="90000"/>
+              </a:lnSpc>
+              <a:spcBef>
+                <a:spcPts val="500"/>
+              </a:spcBef>
+              <a:buFont typeface="Arial" panose="020B0604020202020204" pitchFamily="34" charset="0"/>
+              <a:buChar char="•"/>
+              <a:defRPr sz="1800" kern="1200">
+                <a:solidFill>
+                  <a:schemeClr val="tx1"/>
+                </a:solidFill>
+                <a:latin typeface="+mn-lt"/>
+                <a:ea typeface="+mn-ea"/>
+                <a:cs typeface="+mn-cs"/>
+              </a:defRPr>
+            </a:lvl6pPr>
+            <a:lvl7pPr marL="2971800" indent="-228600" algn="l" defTabSz="914400" rtl="0" eaLnBrk="1" latinLnBrk="0" hangingPunct="1">
+              <a:lnSpc>
+                <a:spcPct val="90000"/>
+              </a:lnSpc>
+              <a:spcBef>
+                <a:spcPts val="500"/>
+              </a:spcBef>
+              <a:buFont typeface="Arial" panose="020B0604020202020204" pitchFamily="34" charset="0"/>
+              <a:buChar char="•"/>
+              <a:defRPr sz="1800" kern="1200">
+                <a:solidFill>
+                  <a:schemeClr val="tx1"/>
+                </a:solidFill>
+                <a:latin typeface="+mn-lt"/>
+                <a:ea typeface="+mn-ea"/>
+                <a:cs typeface="+mn-cs"/>
+              </a:defRPr>
+            </a:lvl7pPr>
+            <a:lvl8pPr marL="3429000" indent="-228600" algn="l" defTabSz="914400" rtl="0" eaLnBrk="1" latinLnBrk="0" hangingPunct="1">
+              <a:lnSpc>
+                <a:spcPct val="90000"/>
+              </a:lnSpc>
+              <a:spcBef>
+                <a:spcPts val="500"/>
+              </a:spcBef>
+              <a:buFont typeface="Arial" panose="020B0604020202020204" pitchFamily="34" charset="0"/>
+              <a:buChar char="•"/>
+              <a:defRPr sz="1800" kern="1200">
+                <a:solidFill>
+                  <a:schemeClr val="tx1"/>
+                </a:solidFill>
+                <a:latin typeface="+mn-lt"/>
+                <a:ea typeface="+mn-ea"/>
+                <a:cs typeface="+mn-cs"/>
+              </a:defRPr>
+            </a:lvl8pPr>
+            <a:lvl9pPr marL="3886200" indent="-228600" algn="l" defTabSz="914400" rtl="0" eaLnBrk="1" latinLnBrk="0" hangingPunct="1">
+              <a:lnSpc>
+                <a:spcPct val="90000"/>
+              </a:lnSpc>
+              <a:spcBef>
+                <a:spcPts val="500"/>
+              </a:spcBef>
+              <a:buFont typeface="Arial" panose="020B0604020202020204" pitchFamily="34" charset="0"/>
+              <a:buChar char="•"/>
+              <a:defRPr sz="1800" kern="1200">
+                <a:solidFill>
+                  <a:schemeClr val="tx1"/>
+                </a:solidFill>
+                <a:latin typeface="+mn-lt"/>
+                <a:ea typeface="+mn-ea"/>
+                <a:cs typeface="+mn-cs"/>
+              </a:defRPr>
+            </a:lvl9pPr>
+          </a:lstStyle>
+          <a:p>
+            <a:r>
+              <a:rPr lang="en-US" dirty="0"/>
+              <a:t>Many GPU processors use multiple threads to hide latency:</a:t>
+            </a:r>
+          </a:p>
+        </p:txBody>
+      </p:sp>
+      <p:pic>
+        <p:nvPicPr>
+          <p:cNvPr id="9" name="Picture 8">
+            <a:extLst>
+              <a:ext uri="{FF2B5EF4-FFF2-40B4-BE49-F238E27FC236}">
+                <a16:creationId xmlns:a16="http://schemas.microsoft.com/office/drawing/2014/main" id="{592BEDA7-D336-489B-87BF-E9A4519C1033}"/>
+              </a:ext>
+            </a:extLst>
+          </p:cNvPr>
+          <p:cNvPicPr>
+            <a:picLocks noChangeAspect="1"/>
+          </p:cNvPicPr>
+          <p:nvPr/>
+        </p:nvPicPr>
+        <p:blipFill>
+          <a:blip r:embed="rId3"/>
+          <a:stretch>
+            <a:fillRect/>
+          </a:stretch>
+        </p:blipFill>
+        <p:spPr>
+          <a:xfrm>
+            <a:off x="6573950" y="4046220"/>
+            <a:ext cx="4959624" cy="2383763"/>
+          </a:xfrm>
+          <a:prstGeom prst="rect">
+            <a:avLst/>
+          </a:prstGeom>
+        </p:spPr>
+      </p:pic>
+    </p:spTree>
+    <p:extLst>
+      <p:ext uri="{BB962C8B-B14F-4D97-AF65-F5344CB8AC3E}">
+        <p14:creationId xmlns:p14="http://schemas.microsoft.com/office/powerpoint/2010/main" val="1922355098"/>
+      </p:ext>
+    </p:extLst>
+  </p:cSld>
+  <p:clrMapOvr>
+    <a:masterClrMapping/>
+  </p:clrMapOvr>
+</p:sld>
+</file>
+
+<file path=ppt/slides/slide9.xml><?xml version="1.0" encoding="utf-8"?>
+<p:sld xmlns:a="http://schemas.openxmlformats.org/drawingml/2006/main" xmlns:r="http://schemas.openxmlformats.org/officeDocument/2006/relationships" xmlns:p="http://schemas.openxmlformats.org/presentationml/2006/main">
+  <p:cSld>
+    <p:spTree>
+      <p:nvGrpSpPr>
+        <p:cNvPr id="1" name=""/>
+        <p:cNvGrpSpPr/>
+        <p:nvPr/>
+      </p:nvGrpSpPr>
+      <p:grpSpPr>
+        <a:xfrm>
+          <a:off x="0" y="0"/>
+          <a:ext cx="0" cy="0"/>
+          <a:chOff x="0" y="0"/>
+          <a:chExt cx="0" cy="0"/>
+        </a:xfrm>
+      </p:grpSpPr>
+      <p:sp>
+        <p:nvSpPr>
+          <p:cNvPr id="4" name="Title 3">
+            <a:extLst>
+              <a:ext uri="{FF2B5EF4-FFF2-40B4-BE49-F238E27FC236}">
+                <a16:creationId xmlns:a16="http://schemas.microsoft.com/office/drawing/2014/main" id="{4399870D-8B9F-41E0-8ED7-1D0F2D731A40}"/>
+              </a:ext>
+            </a:extLst>
+          </p:cNvPr>
+          <p:cNvSpPr>
+            <a:spLocks noGrp="1"/>
+          </p:cNvSpPr>
+          <p:nvPr>
+            <p:ph type="title"/>
+          </p:nvPr>
+        </p:nvSpPr>
+        <p:spPr/>
+        <p:txBody>
+          <a:bodyPr/>
+          <a:lstStyle/>
+          <a:p>
+            <a:r>
+              <a:rPr lang="en-US" dirty="0"/>
+              <a:t>Memory</a:t>
+            </a:r>
+          </a:p>
+        </p:txBody>
+      </p:sp>
+      <p:sp>
+        <p:nvSpPr>
+          <p:cNvPr id="5" name="Text Placeholder 4">
+            <a:extLst>
+              <a:ext uri="{FF2B5EF4-FFF2-40B4-BE49-F238E27FC236}">
+                <a16:creationId xmlns:a16="http://schemas.microsoft.com/office/drawing/2014/main" id="{B696F883-EA29-4DAF-A936-BDB587FC26EB}"/>
+              </a:ext>
+            </a:extLst>
+          </p:cNvPr>
+          <p:cNvSpPr>
+            <a:spLocks noGrp="1"/>
+          </p:cNvSpPr>
+          <p:nvPr>
+            <p:ph type="body" idx="1"/>
+          </p:nvPr>
+        </p:nvSpPr>
+        <p:spPr/>
+        <p:txBody>
+          <a:bodyPr/>
+          <a:lstStyle/>
+          <a:p>
+            <a:r>
+              <a:rPr lang="en-US" dirty="0"/>
+              <a:t>Keep the GPU fed and happy!</a:t>
+            </a:r>
+          </a:p>
+        </p:txBody>
+      </p:sp>
+    </p:spTree>
+    <p:extLst>
+      <p:ext uri="{BB962C8B-B14F-4D97-AF65-F5344CB8AC3E}">
+        <p14:creationId xmlns:p14="http://schemas.microsoft.com/office/powerpoint/2010/main" val="3858959561"/>
       </p:ext>
     </p:extLst>
   </p:cSld>

</xml_diff>